<commit_message>
Corrected figure on the 10 year rp
</commit_message>
<xml_diff>
--- a/Figures/09_OBS_NWP_Rainfall_10RP.pptx
+++ b/Figures/09_OBS_NWP_Rainfall_10RP.pptx
@@ -115,7 +115,7 @@
 <file path=ppt/revisionInfo.xml><?xml version="1.0" encoding="utf-8"?>
 <p1510:revInfo xmlns:a="http://schemas.openxmlformats.org/drawingml/2006/main" xmlns:r="http://schemas.openxmlformats.org/officeDocument/2006/relationships" xmlns:p1510="http://schemas.microsoft.com/office/powerpoint/2015/10/main">
   <p1510:revLst>
-    <p1510:client id="{D7665304-D006-4503-97B3-8B4DB4E575C5}" v="9" dt="2026-02-03T23:19:48.460"/>
+    <p1510:client id="{D7665304-D006-4503-97B3-8B4DB4E575C5}" v="11" dt="2026-02-04T00:09:57.317"/>
   </p1510:revLst>
 </p1510:revInfo>
 </file>
@@ -125,7 +125,7 @@
   <pc:docChgLst>
     <pc:chgData name="Fatima Pillosu" userId="a6295d4dc9e22643" providerId="LiveId" clId="{87453732-75AC-4426-B5D3-B7C69C2D4F54}"/>
     <pc:docChg chg="undo custSel addSld delSld modSld sldOrd">
-      <pc:chgData name="Fatima Pillosu" userId="a6295d4dc9e22643" providerId="LiveId" clId="{87453732-75AC-4426-B5D3-B7C69C2D4F54}" dt="2026-02-03T23:20:28.627" v="730" actId="2696"/>
+      <pc:chgData name="Fatima Pillosu" userId="a6295d4dc9e22643" providerId="LiveId" clId="{87453732-75AC-4426-B5D3-B7C69C2D4F54}" dt="2026-02-04T00:11:41.404" v="771" actId="1076"/>
       <pc:docMkLst>
         <pc:docMk/>
       </pc:docMkLst>
@@ -673,13 +673,13 @@
         </pc:spChg>
       </pc:sldChg>
       <pc:sldChg chg="addSp delSp modSp add mod">
-        <pc:chgData name="Fatima Pillosu" userId="a6295d4dc9e22643" providerId="LiveId" clId="{87453732-75AC-4426-B5D3-B7C69C2D4F54}" dt="2026-02-03T23:19:59.164" v="729" actId="552"/>
+        <pc:chgData name="Fatima Pillosu" userId="a6295d4dc9e22643" providerId="LiveId" clId="{87453732-75AC-4426-B5D3-B7C69C2D4F54}" dt="2026-02-04T00:11:41.404" v="771" actId="1076"/>
         <pc:sldMkLst>
           <pc:docMk/>
           <pc:sldMk cId="3613734767" sldId="257"/>
         </pc:sldMkLst>
         <pc:spChg chg="add mod">
-          <ac:chgData name="Fatima Pillosu" userId="a6295d4dc9e22643" providerId="LiveId" clId="{87453732-75AC-4426-B5D3-B7C69C2D4F54}" dt="2026-02-03T23:17:30.863" v="512" actId="1035"/>
+          <ac:chgData name="Fatima Pillosu" userId="a6295d4dc9e22643" providerId="LiveId" clId="{87453732-75AC-4426-B5D3-B7C69C2D4F54}" dt="2026-02-04T00:09:14.927" v="740" actId="1036"/>
           <ac:spMkLst>
             <pc:docMk/>
             <pc:sldMk cId="3613734767" sldId="257"/>
@@ -687,7 +687,7 @@
           </ac:spMkLst>
         </pc:spChg>
         <pc:spChg chg="add mod">
-          <ac:chgData name="Fatima Pillosu" userId="a6295d4dc9e22643" providerId="LiveId" clId="{87453732-75AC-4426-B5D3-B7C69C2D4F54}" dt="2026-02-03T23:17:30.863" v="512" actId="1035"/>
+          <ac:chgData name="Fatima Pillosu" userId="a6295d4dc9e22643" providerId="LiveId" clId="{87453732-75AC-4426-B5D3-B7C69C2D4F54}" dt="2026-02-04T00:09:14.927" v="740" actId="1036"/>
           <ac:spMkLst>
             <pc:docMk/>
             <pc:sldMk cId="3613734767" sldId="257"/>
@@ -695,7 +695,7 @@
           </ac:spMkLst>
         </pc:spChg>
         <pc:spChg chg="add mod">
-          <ac:chgData name="Fatima Pillosu" userId="a6295d4dc9e22643" providerId="LiveId" clId="{87453732-75AC-4426-B5D3-B7C69C2D4F54}" dt="2026-02-03T23:19:59.164" v="729" actId="552"/>
+          <ac:chgData name="Fatima Pillosu" userId="a6295d4dc9e22643" providerId="LiveId" clId="{87453732-75AC-4426-B5D3-B7C69C2D4F54}" dt="2026-02-04T00:09:14.927" v="740" actId="1036"/>
           <ac:spMkLst>
             <pc:docMk/>
             <pc:sldMk cId="3613734767" sldId="257"/>
@@ -703,7 +703,7 @@
           </ac:spMkLst>
         </pc:spChg>
         <pc:spChg chg="add mod">
-          <ac:chgData name="Fatima Pillosu" userId="a6295d4dc9e22643" providerId="LiveId" clId="{87453732-75AC-4426-B5D3-B7C69C2D4F54}" dt="2026-02-03T23:19:17.881" v="718" actId="1037"/>
+          <ac:chgData name="Fatima Pillosu" userId="a6295d4dc9e22643" providerId="LiveId" clId="{87453732-75AC-4426-B5D3-B7C69C2D4F54}" dt="2026-02-04T00:09:14.927" v="740" actId="1036"/>
           <ac:spMkLst>
             <pc:docMk/>
             <pc:sldMk cId="3613734767" sldId="257"/>
@@ -711,7 +711,7 @@
           </ac:spMkLst>
         </pc:spChg>
         <pc:spChg chg="add mod">
-          <ac:chgData name="Fatima Pillosu" userId="a6295d4dc9e22643" providerId="LiveId" clId="{87453732-75AC-4426-B5D3-B7C69C2D4F54}" dt="2026-02-03T23:19:17.881" v="718" actId="1037"/>
+          <ac:chgData name="Fatima Pillosu" userId="a6295d4dc9e22643" providerId="LiveId" clId="{87453732-75AC-4426-B5D3-B7C69C2D4F54}" dt="2026-02-04T00:09:14.927" v="740" actId="1036"/>
           <ac:spMkLst>
             <pc:docMk/>
             <pc:sldMk cId="3613734767" sldId="257"/>
@@ -719,7 +719,7 @@
           </ac:spMkLst>
         </pc:spChg>
         <pc:spChg chg="add mod">
-          <ac:chgData name="Fatima Pillosu" userId="a6295d4dc9e22643" providerId="LiveId" clId="{87453732-75AC-4426-B5D3-B7C69C2D4F54}" dt="2026-02-03T23:19:17.881" v="718" actId="1037"/>
+          <ac:chgData name="Fatima Pillosu" userId="a6295d4dc9e22643" providerId="LiveId" clId="{87453732-75AC-4426-B5D3-B7C69C2D4F54}" dt="2026-02-04T00:09:14.927" v="740" actId="1036"/>
           <ac:spMkLst>
             <pc:docMk/>
             <pc:sldMk cId="3613734767" sldId="257"/>
@@ -727,7 +727,7 @@
           </ac:spMkLst>
         </pc:spChg>
         <pc:spChg chg="add mod">
-          <ac:chgData name="Fatima Pillosu" userId="a6295d4dc9e22643" providerId="LiveId" clId="{87453732-75AC-4426-B5D3-B7C69C2D4F54}" dt="2026-02-03T23:19:17.881" v="718" actId="1037"/>
+          <ac:chgData name="Fatima Pillosu" userId="a6295d4dc9e22643" providerId="LiveId" clId="{87453732-75AC-4426-B5D3-B7C69C2D4F54}" dt="2026-02-04T00:09:14.927" v="740" actId="1036"/>
           <ac:spMkLst>
             <pc:docMk/>
             <pc:sldMk cId="3613734767" sldId="257"/>
@@ -815,7 +815,7 @@
           </ac:spMkLst>
         </pc:spChg>
         <pc:spChg chg="add mod">
-          <ac:chgData name="Fatima Pillosu" userId="a6295d4dc9e22643" providerId="LiveId" clId="{87453732-75AC-4426-B5D3-B7C69C2D4F54}" dt="2026-02-03T23:19:59.164" v="729" actId="552"/>
+          <ac:chgData name="Fatima Pillosu" userId="a6295d4dc9e22643" providerId="LiveId" clId="{87453732-75AC-4426-B5D3-B7C69C2D4F54}" dt="2026-02-04T00:09:22.863" v="746" actId="1036"/>
           <ac:spMkLst>
             <pc:docMk/>
             <pc:sldMk cId="3613734767" sldId="257"/>
@@ -823,7 +823,7 @@
           </ac:spMkLst>
         </pc:spChg>
         <pc:spChg chg="add mod">
-          <ac:chgData name="Fatima Pillosu" userId="a6295d4dc9e22643" providerId="LiveId" clId="{87453732-75AC-4426-B5D3-B7C69C2D4F54}" dt="2026-02-03T23:19:59.164" v="729" actId="552"/>
+          <ac:chgData name="Fatima Pillosu" userId="a6295d4dc9e22643" providerId="LiveId" clId="{87453732-75AC-4426-B5D3-B7C69C2D4F54}" dt="2026-02-04T00:09:22.863" v="746" actId="1036"/>
           <ac:spMkLst>
             <pc:docMk/>
             <pc:sldMk cId="3613734767" sldId="257"/>
@@ -831,7 +831,7 @@
           </ac:spMkLst>
         </pc:spChg>
         <pc:spChg chg="add mod">
-          <ac:chgData name="Fatima Pillosu" userId="a6295d4dc9e22643" providerId="LiveId" clId="{87453732-75AC-4426-B5D3-B7C69C2D4F54}" dt="2026-02-03T23:19:59.164" v="729" actId="552"/>
+          <ac:chgData name="Fatima Pillosu" userId="a6295d4dc9e22643" providerId="LiveId" clId="{87453732-75AC-4426-B5D3-B7C69C2D4F54}" dt="2026-02-04T00:09:22.863" v="746" actId="1036"/>
           <ac:spMkLst>
             <pc:docMk/>
             <pc:sldMk cId="3613734767" sldId="257"/>
@@ -839,7 +839,7 @@
           </ac:spMkLst>
         </pc:spChg>
         <pc:spChg chg="add mod">
-          <ac:chgData name="Fatima Pillosu" userId="a6295d4dc9e22643" providerId="LiveId" clId="{87453732-75AC-4426-B5D3-B7C69C2D4F54}" dt="2026-02-03T23:19:59.164" v="729" actId="552"/>
+          <ac:chgData name="Fatima Pillosu" userId="a6295d4dc9e22643" providerId="LiveId" clId="{87453732-75AC-4426-B5D3-B7C69C2D4F54}" dt="2026-02-04T00:09:22.863" v="746" actId="1036"/>
           <ac:spMkLst>
             <pc:docMk/>
             <pc:sldMk cId="3613734767" sldId="257"/>
@@ -847,13 +847,197 @@
           </ac:spMkLst>
         </pc:spChg>
         <pc:spChg chg="add mod">
-          <ac:chgData name="Fatima Pillosu" userId="a6295d4dc9e22643" providerId="LiveId" clId="{87453732-75AC-4426-B5D3-B7C69C2D4F54}" dt="2026-02-03T23:19:59.164" v="729" actId="552"/>
+          <ac:chgData name="Fatima Pillosu" userId="a6295d4dc9e22643" providerId="LiveId" clId="{87453732-75AC-4426-B5D3-B7C69C2D4F54}" dt="2026-02-04T00:09:22.863" v="746" actId="1036"/>
           <ac:spMkLst>
             <pc:docMk/>
             <pc:sldMk cId="3613734767" sldId="257"/>
             <ac:spMk id="28" creationId="{0FE2BF87-00B9-4CA5-C4F6-B7A352BE569A}"/>
           </ac:spMkLst>
         </pc:spChg>
+        <pc:spChg chg="mod">
+          <ac:chgData name="Fatima Pillosu" userId="a6295d4dc9e22643" providerId="LiveId" clId="{87453732-75AC-4426-B5D3-B7C69C2D4F54}" dt="2026-02-04T00:10:07.030" v="749" actId="1076"/>
+          <ac:spMkLst>
+            <pc:docMk/>
+            <pc:sldMk cId="3613734767" sldId="257"/>
+            <ac:spMk id="29" creationId="{DCCF35C2-2B4D-5E8A-977D-51474F934E5F}"/>
+          </ac:spMkLst>
+        </pc:spChg>
+        <pc:spChg chg="mod">
+          <ac:chgData name="Fatima Pillosu" userId="a6295d4dc9e22643" providerId="LiveId" clId="{87453732-75AC-4426-B5D3-B7C69C2D4F54}" dt="2026-02-04T00:10:11.193" v="750" actId="1076"/>
+          <ac:spMkLst>
+            <pc:docMk/>
+            <pc:sldMk cId="3613734767" sldId="257"/>
+            <ac:spMk id="30" creationId="{8AB7F894-0E98-5152-5E16-DE12099F8A67}"/>
+          </ac:spMkLst>
+        </pc:spChg>
+        <pc:spChg chg="mod">
+          <ac:chgData name="Fatima Pillosu" userId="a6295d4dc9e22643" providerId="LiveId" clId="{87453732-75AC-4426-B5D3-B7C69C2D4F54}" dt="2026-02-04T00:10:13.735" v="751" actId="1076"/>
+          <ac:spMkLst>
+            <pc:docMk/>
+            <pc:sldMk cId="3613734767" sldId="257"/>
+            <ac:spMk id="31" creationId="{CD34C7D8-FB8C-8E4E-6E9C-C545B9C9B706}"/>
+          </ac:spMkLst>
+        </pc:spChg>
+        <pc:spChg chg="add mod">
+          <ac:chgData name="Fatima Pillosu" userId="a6295d4dc9e22643" providerId="LiveId" clId="{87453732-75AC-4426-B5D3-B7C69C2D4F54}" dt="2026-02-04T00:10:21.739" v="753" actId="1076"/>
+          <ac:spMkLst>
+            <pc:docMk/>
+            <pc:sldMk cId="3613734767" sldId="257"/>
+            <ac:spMk id="32" creationId="{920CA514-37F8-ABA1-0480-39805F95E26D}"/>
+          </ac:spMkLst>
+        </pc:spChg>
+        <pc:spChg chg="mod">
+          <ac:chgData name="Fatima Pillosu" userId="a6295d4dc9e22643" providerId="LiveId" clId="{87453732-75AC-4426-B5D3-B7C69C2D4F54}" dt="2026-02-04T00:10:17.758" v="752" actId="1076"/>
+          <ac:spMkLst>
+            <pc:docMk/>
+            <pc:sldMk cId="3613734767" sldId="257"/>
+            <ac:spMk id="33" creationId="{0C330A33-6E45-0048-8D6D-D89BFDF4C1CF}"/>
+          </ac:spMkLst>
+        </pc:spChg>
+        <pc:spChg chg="mod">
+          <ac:chgData name="Fatima Pillosu" userId="a6295d4dc9e22643" providerId="LiveId" clId="{87453732-75AC-4426-B5D3-B7C69C2D4F54}" dt="2026-02-04T00:10:24.456" v="754" actId="1076"/>
+          <ac:spMkLst>
+            <pc:docMk/>
+            <pc:sldMk cId="3613734767" sldId="257"/>
+            <ac:spMk id="34" creationId="{EF0F9FEF-8958-6B24-2572-774155AC86FB}"/>
+          </ac:spMkLst>
+        </pc:spChg>
+        <pc:spChg chg="mod">
+          <ac:chgData name="Fatima Pillosu" userId="a6295d4dc9e22643" providerId="LiveId" clId="{87453732-75AC-4426-B5D3-B7C69C2D4F54}" dt="2026-02-04T00:10:27.153" v="755" actId="1076"/>
+          <ac:spMkLst>
+            <pc:docMk/>
+            <pc:sldMk cId="3613734767" sldId="257"/>
+            <ac:spMk id="35" creationId="{A0BC7F93-A6C9-6A77-0154-0FE7F7743B0D}"/>
+          </ac:spMkLst>
+        </pc:spChg>
+        <pc:spChg chg="mod">
+          <ac:chgData name="Fatima Pillosu" userId="a6295d4dc9e22643" providerId="LiveId" clId="{87453732-75AC-4426-B5D3-B7C69C2D4F54}" dt="2026-02-04T00:10:31.568" v="756" actId="1076"/>
+          <ac:spMkLst>
+            <pc:docMk/>
+            <pc:sldMk cId="3613734767" sldId="257"/>
+            <ac:spMk id="36" creationId="{F66BA967-1449-B19C-3664-D56311A4881C}"/>
+          </ac:spMkLst>
+        </pc:spChg>
+        <pc:spChg chg="add mod">
+          <ac:chgData name="Fatima Pillosu" userId="a6295d4dc9e22643" providerId="LiveId" clId="{87453732-75AC-4426-B5D3-B7C69C2D4F54}" dt="2026-02-04T00:10:34.714" v="757" actId="1076"/>
+          <ac:spMkLst>
+            <pc:docMk/>
+            <pc:sldMk cId="3613734767" sldId="257"/>
+            <ac:spMk id="37" creationId="{B27B5B8C-FA50-B6E2-F0C4-92CF47BDE12E}"/>
+          </ac:spMkLst>
+        </pc:spChg>
+        <pc:spChg chg="add mod">
+          <ac:chgData name="Fatima Pillosu" userId="a6295d4dc9e22643" providerId="LiveId" clId="{87453732-75AC-4426-B5D3-B7C69C2D4F54}" dt="2026-02-04T00:10:42.365" v="759" actId="1076"/>
+          <ac:spMkLst>
+            <pc:docMk/>
+            <pc:sldMk cId="3613734767" sldId="257"/>
+            <ac:spMk id="38" creationId="{184115E0-3246-EC3D-9C4E-742642B3440E}"/>
+          </ac:spMkLst>
+        </pc:spChg>
+        <pc:spChg chg="mod">
+          <ac:chgData name="Fatima Pillosu" userId="a6295d4dc9e22643" providerId="LiveId" clId="{87453732-75AC-4426-B5D3-B7C69C2D4F54}" dt="2026-02-04T00:10:37.816" v="758" actId="1076"/>
+          <ac:spMkLst>
+            <pc:docMk/>
+            <pc:sldMk cId="3613734767" sldId="257"/>
+            <ac:spMk id="39" creationId="{5303C2B2-76E3-B734-E776-20F68CE1A725}"/>
+          </ac:spMkLst>
+        </pc:spChg>
+        <pc:spChg chg="add mod">
+          <ac:chgData name="Fatima Pillosu" userId="a6295d4dc9e22643" providerId="LiveId" clId="{87453732-75AC-4426-B5D3-B7C69C2D4F54}" dt="2026-02-04T00:11:19.193" v="766" actId="1076"/>
+          <ac:spMkLst>
+            <pc:docMk/>
+            <pc:sldMk cId="3613734767" sldId="257"/>
+            <ac:spMk id="40" creationId="{DF0CC77A-0C8F-A9D9-BDAD-CD3E33DCB230}"/>
+          </ac:spMkLst>
+        </pc:spChg>
+        <pc:spChg chg="add mod">
+          <ac:chgData name="Fatima Pillosu" userId="a6295d4dc9e22643" providerId="LiveId" clId="{87453732-75AC-4426-B5D3-B7C69C2D4F54}" dt="2026-02-04T00:11:23.964" v="767" actId="1076"/>
+          <ac:spMkLst>
+            <pc:docMk/>
+            <pc:sldMk cId="3613734767" sldId="257"/>
+            <ac:spMk id="41" creationId="{07C4EFFF-CB25-B85A-0629-7430E6F783E2}"/>
+          </ac:spMkLst>
+        </pc:spChg>
+        <pc:spChg chg="mod">
+          <ac:chgData name="Fatima Pillosu" userId="a6295d4dc9e22643" providerId="LiveId" clId="{87453732-75AC-4426-B5D3-B7C69C2D4F54}" dt="2026-02-04T00:11:28.318" v="768" actId="1076"/>
+          <ac:spMkLst>
+            <pc:docMk/>
+            <pc:sldMk cId="3613734767" sldId="257"/>
+            <ac:spMk id="42" creationId="{18EC3451-6E8A-D526-C3F6-0701D3FC74A7}"/>
+          </ac:spMkLst>
+        </pc:spChg>
+        <pc:spChg chg="mod">
+          <ac:chgData name="Fatima Pillosu" userId="a6295d4dc9e22643" providerId="LiveId" clId="{87453732-75AC-4426-B5D3-B7C69C2D4F54}" dt="2026-02-04T00:11:31.181" v="769" actId="1076"/>
+          <ac:spMkLst>
+            <pc:docMk/>
+            <pc:sldMk cId="3613734767" sldId="257"/>
+            <ac:spMk id="43" creationId="{72FAAEA1-A1D8-9538-DD5E-664B48510042}"/>
+          </ac:spMkLst>
+        </pc:spChg>
+        <pc:spChg chg="mod">
+          <ac:chgData name="Fatima Pillosu" userId="a6295d4dc9e22643" providerId="LiveId" clId="{87453732-75AC-4426-B5D3-B7C69C2D4F54}" dt="2026-02-04T00:11:35.826" v="770" actId="1076"/>
+          <ac:spMkLst>
+            <pc:docMk/>
+            <pc:sldMk cId="3613734767" sldId="257"/>
+            <ac:spMk id="44" creationId="{18B7E8BF-6040-2634-0A69-A07848E46CF0}"/>
+          </ac:spMkLst>
+        </pc:spChg>
+        <pc:spChg chg="mod">
+          <ac:chgData name="Fatima Pillosu" userId="a6295d4dc9e22643" providerId="LiveId" clId="{87453732-75AC-4426-B5D3-B7C69C2D4F54}" dt="2026-02-04T00:11:41.404" v="771" actId="1076"/>
+          <ac:spMkLst>
+            <pc:docMk/>
+            <pc:sldMk cId="3613734767" sldId="257"/>
+            <ac:spMk id="45" creationId="{49844F99-8226-C4FF-3803-07BFB4CA2ACD}"/>
+          </ac:spMkLst>
+        </pc:spChg>
+        <pc:spChg chg="add mod">
+          <ac:chgData name="Fatima Pillosu" userId="a6295d4dc9e22643" providerId="LiveId" clId="{87453732-75AC-4426-B5D3-B7C69C2D4F54}" dt="2026-02-04T00:10:47.704" v="760" actId="1076"/>
+          <ac:spMkLst>
+            <pc:docMk/>
+            <pc:sldMk cId="3613734767" sldId="257"/>
+            <ac:spMk id="46" creationId="{54C9AA82-B1DD-CE17-438B-285683A2A7D4}"/>
+          </ac:spMkLst>
+        </pc:spChg>
+        <pc:spChg chg="add mod">
+          <ac:chgData name="Fatima Pillosu" userId="a6295d4dc9e22643" providerId="LiveId" clId="{87453732-75AC-4426-B5D3-B7C69C2D4F54}" dt="2026-02-04T00:10:52.703" v="761" actId="1076"/>
+          <ac:spMkLst>
+            <pc:docMk/>
+            <pc:sldMk cId="3613734767" sldId="257"/>
+            <ac:spMk id="47" creationId="{E2E1CB9F-196C-A33A-3488-DA8464A46012}"/>
+          </ac:spMkLst>
+        </pc:spChg>
+        <pc:spChg chg="mod">
+          <ac:chgData name="Fatima Pillosu" userId="a6295d4dc9e22643" providerId="LiveId" clId="{87453732-75AC-4426-B5D3-B7C69C2D4F54}" dt="2026-02-04T00:10:56.212" v="762" actId="1076"/>
+          <ac:spMkLst>
+            <pc:docMk/>
+            <pc:sldMk cId="3613734767" sldId="257"/>
+            <ac:spMk id="48" creationId="{2ECFB7EF-0139-0B74-8D42-119F3A295EB2}"/>
+          </ac:spMkLst>
+        </pc:spChg>
+        <pc:spChg chg="add mod">
+          <ac:chgData name="Fatima Pillosu" userId="a6295d4dc9e22643" providerId="LiveId" clId="{87453732-75AC-4426-B5D3-B7C69C2D4F54}" dt="2026-02-04T00:10:59.058" v="763" actId="1076"/>
+          <ac:spMkLst>
+            <pc:docMk/>
+            <pc:sldMk cId="3613734767" sldId="257"/>
+            <ac:spMk id="49" creationId="{E31C0926-FCAD-84AE-58E0-61A04006E733}"/>
+          </ac:spMkLst>
+        </pc:spChg>
+        <pc:spChg chg="add mod">
+          <ac:chgData name="Fatima Pillosu" userId="a6295d4dc9e22643" providerId="LiveId" clId="{87453732-75AC-4426-B5D3-B7C69C2D4F54}" dt="2026-02-04T00:11:04.548" v="764" actId="1076"/>
+          <ac:spMkLst>
+            <pc:docMk/>
+            <pc:sldMk cId="3613734767" sldId="257"/>
+            <ac:spMk id="50" creationId="{397E542B-DA69-5379-EF91-BD404A2D8B85}"/>
+          </ac:spMkLst>
+        </pc:spChg>
+        <pc:spChg chg="add mod">
+          <ac:chgData name="Fatima Pillosu" userId="a6295d4dc9e22643" providerId="LiveId" clId="{87453732-75AC-4426-B5D3-B7C69C2D4F54}" dt="2026-02-04T00:11:15.456" v="765" actId="1076"/>
+          <ac:spMkLst>
+            <pc:docMk/>
+            <pc:sldMk cId="3613734767" sldId="257"/>
+            <ac:spMk id="51" creationId="{962F0B89-6E40-5A13-E7CD-2E866065F2EC}"/>
+          </ac:spMkLst>
+        </pc:spChg>
         <pc:spChg chg="del">
           <ac:chgData name="Fatima Pillosu" userId="a6295d4dc9e22643" providerId="LiveId" clId="{87453732-75AC-4426-B5D3-B7C69C2D4F54}" dt="2026-02-03T23:10:31.667" v="259" actId="478"/>
           <ac:spMkLst>
@@ -1079,7 +1263,7 @@
           </ac:spMkLst>
         </pc:spChg>
         <pc:spChg chg="mod">
-          <ac:chgData name="Fatima Pillosu" userId="a6295d4dc9e22643" providerId="LiveId" clId="{87453732-75AC-4426-B5D3-B7C69C2D4F54}" dt="2026-02-03T23:15:32.627" v="387" actId="1037"/>
+          <ac:chgData name="Fatima Pillosu" userId="a6295d4dc9e22643" providerId="LiveId" clId="{87453732-75AC-4426-B5D3-B7C69C2D4F54}" dt="2026-02-04T00:09:22.863" v="746" actId="1036"/>
           <ac:spMkLst>
             <pc:docMk/>
             <pc:sldMk cId="3613734767" sldId="257"/>
@@ -1087,7 +1271,7 @@
           </ac:spMkLst>
         </pc:spChg>
         <pc:spChg chg="mod">
-          <ac:chgData name="Fatima Pillosu" userId="a6295d4dc9e22643" providerId="LiveId" clId="{87453732-75AC-4426-B5D3-B7C69C2D4F54}" dt="2026-02-03T23:17:23.485" v="509" actId="1038"/>
+          <ac:chgData name="Fatima Pillosu" userId="a6295d4dc9e22643" providerId="LiveId" clId="{87453732-75AC-4426-B5D3-B7C69C2D4F54}" dt="2026-02-04T00:09:22.863" v="746" actId="1036"/>
           <ac:spMkLst>
             <pc:docMk/>
             <pc:sldMk cId="3613734767" sldId="257"/>
@@ -1143,15 +1327,23 @@
           </ac:grpSpMkLst>
         </pc:grpChg>
         <pc:picChg chg="add mod">
-          <ac:chgData name="Fatima Pillosu" userId="a6295d4dc9e22643" providerId="LiveId" clId="{87453732-75AC-4426-B5D3-B7C69C2D4F54}" dt="2026-02-03T23:15:45.987" v="388" actId="12788"/>
+          <ac:chgData name="Fatima Pillosu" userId="a6295d4dc9e22643" providerId="LiveId" clId="{87453732-75AC-4426-B5D3-B7C69C2D4F54}" dt="2026-02-04T00:09:14.927" v="740" actId="1036"/>
+          <ac:picMkLst>
+            <pc:docMk/>
+            <pc:sldMk cId="3613734767" sldId="257"/>
+            <ac:picMk id="2" creationId="{A2DDA11B-F416-B74F-FC53-0DD17ED94431}"/>
+          </ac:picMkLst>
+        </pc:picChg>
+        <pc:picChg chg="add mod">
+          <ac:chgData name="Fatima Pillosu" userId="a6295d4dc9e22643" providerId="LiveId" clId="{87453732-75AC-4426-B5D3-B7C69C2D4F54}" dt="2026-02-04T00:09:22.863" v="746" actId="1036"/>
           <ac:picMkLst>
             <pc:docMk/>
             <pc:sldMk cId="3613734767" sldId="257"/>
             <ac:picMk id="4" creationId="{C6A13427-C4BA-DCEF-EAAA-4D063B50F8B4}"/>
           </ac:picMkLst>
         </pc:picChg>
-        <pc:picChg chg="add mod">
-          <ac:chgData name="Fatima Pillosu" userId="a6295d4dc9e22643" providerId="LiveId" clId="{87453732-75AC-4426-B5D3-B7C69C2D4F54}" dt="2026-02-03T23:13:31.388" v="369" actId="1035"/>
+        <pc:picChg chg="add del mod">
+          <ac:chgData name="Fatima Pillosu" userId="a6295d4dc9e22643" providerId="LiveId" clId="{87453732-75AC-4426-B5D3-B7C69C2D4F54}" dt="2026-02-04T00:07:58.378" v="731" actId="478"/>
           <ac:picMkLst>
             <pc:docMk/>
             <pc:sldMk cId="3613734767" sldId="257"/>
@@ -1303,7 +1495,7 @@
           <a:p>
             <a:fld id="{0D1B1566-5782-41C1-BF25-CC47B8AC8D46}" type="datetimeFigureOut">
               <a:rPr lang="en-GB" smtClean="0"/>
-              <a:t>03/02/2026</a:t>
+              <a:t>04/02/2026</a:t>
             </a:fld>
             <a:endParaRPr lang="en-GB"/>
           </a:p>
@@ -1473,7 +1665,7 @@
           <a:p>
             <a:fld id="{0D1B1566-5782-41C1-BF25-CC47B8AC8D46}" type="datetimeFigureOut">
               <a:rPr lang="en-GB" smtClean="0"/>
-              <a:t>03/02/2026</a:t>
+              <a:t>04/02/2026</a:t>
             </a:fld>
             <a:endParaRPr lang="en-GB"/>
           </a:p>
@@ -1653,7 +1845,7 @@
           <a:p>
             <a:fld id="{0D1B1566-5782-41C1-BF25-CC47B8AC8D46}" type="datetimeFigureOut">
               <a:rPr lang="en-GB" smtClean="0"/>
-              <a:t>03/02/2026</a:t>
+              <a:t>04/02/2026</a:t>
             </a:fld>
             <a:endParaRPr lang="en-GB"/>
           </a:p>
@@ -1823,7 +2015,7 @@
           <a:p>
             <a:fld id="{0D1B1566-5782-41C1-BF25-CC47B8AC8D46}" type="datetimeFigureOut">
               <a:rPr lang="en-GB" smtClean="0"/>
-              <a:t>03/02/2026</a:t>
+              <a:t>04/02/2026</a:t>
             </a:fld>
             <a:endParaRPr lang="en-GB"/>
           </a:p>
@@ -2067,7 +2259,7 @@
           <a:p>
             <a:fld id="{0D1B1566-5782-41C1-BF25-CC47B8AC8D46}" type="datetimeFigureOut">
               <a:rPr lang="en-GB" smtClean="0"/>
-              <a:t>03/02/2026</a:t>
+              <a:t>04/02/2026</a:t>
             </a:fld>
             <a:endParaRPr lang="en-GB"/>
           </a:p>
@@ -2299,7 +2491,7 @@
           <a:p>
             <a:fld id="{0D1B1566-5782-41C1-BF25-CC47B8AC8D46}" type="datetimeFigureOut">
               <a:rPr lang="en-GB" smtClean="0"/>
-              <a:t>03/02/2026</a:t>
+              <a:t>04/02/2026</a:t>
             </a:fld>
             <a:endParaRPr lang="en-GB"/>
           </a:p>
@@ -2666,7 +2858,7 @@
           <a:p>
             <a:fld id="{0D1B1566-5782-41C1-BF25-CC47B8AC8D46}" type="datetimeFigureOut">
               <a:rPr lang="en-GB" smtClean="0"/>
-              <a:t>03/02/2026</a:t>
+              <a:t>04/02/2026</a:t>
             </a:fld>
             <a:endParaRPr lang="en-GB"/>
           </a:p>
@@ -2784,7 +2976,7 @@
           <a:p>
             <a:fld id="{0D1B1566-5782-41C1-BF25-CC47B8AC8D46}" type="datetimeFigureOut">
               <a:rPr lang="en-GB" smtClean="0"/>
-              <a:t>03/02/2026</a:t>
+              <a:t>04/02/2026</a:t>
             </a:fld>
             <a:endParaRPr lang="en-GB"/>
           </a:p>
@@ -2879,7 +3071,7 @@
           <a:p>
             <a:fld id="{0D1B1566-5782-41C1-BF25-CC47B8AC8D46}" type="datetimeFigureOut">
               <a:rPr lang="en-GB" smtClean="0"/>
-              <a:t>03/02/2026</a:t>
+              <a:t>04/02/2026</a:t>
             </a:fld>
             <a:endParaRPr lang="en-GB"/>
           </a:p>
@@ -3156,7 +3348,7 @@
           <a:p>
             <a:fld id="{0D1B1566-5782-41C1-BF25-CC47B8AC8D46}" type="datetimeFigureOut">
               <a:rPr lang="en-GB" smtClean="0"/>
-              <a:t>03/02/2026</a:t>
+              <a:t>04/02/2026</a:t>
             </a:fld>
             <a:endParaRPr lang="en-GB"/>
           </a:p>
@@ -3413,7 +3605,7 @@
           <a:p>
             <a:fld id="{0D1B1566-5782-41C1-BF25-CC47B8AC8D46}" type="datetimeFigureOut">
               <a:rPr lang="en-GB" smtClean="0"/>
-              <a:t>03/02/2026</a:t>
+              <a:t>04/02/2026</a:t>
             </a:fld>
             <a:endParaRPr lang="en-GB"/>
           </a:p>
@@ -3626,7 +3818,7 @@
           <a:p>
             <a:fld id="{0D1B1566-5782-41C1-BF25-CC47B8AC8D46}" type="datetimeFigureOut">
               <a:rPr lang="en-GB" smtClean="0"/>
-              <a:t>03/02/2026</a:t>
+              <a:t>04/02/2026</a:t>
             </a:fld>
             <a:endParaRPr lang="en-GB"/>
           </a:p>
@@ -5977,7 +6169,7 @@
         </p:nvSpPr>
         <p:spPr>
           <a:xfrm>
-            <a:off x="-68170" y="2996639"/>
+            <a:off x="-68170" y="3044765"/>
             <a:ext cx="3211515" cy="215444"/>
           </a:xfrm>
           <a:prstGeom prst="rect">
@@ -6029,7 +6221,7 @@
         </p:nvSpPr>
         <p:spPr>
           <a:xfrm>
-            <a:off x="2781059" y="2996639"/>
+            <a:off x="2781059" y="3044765"/>
             <a:ext cx="3211515" cy="215444"/>
           </a:xfrm>
           <a:prstGeom prst="rect">
@@ -6124,7 +6316,7 @@
         </p:blipFill>
         <p:spPr>
           <a:xfrm>
-            <a:off x="277709" y="3179014"/>
+            <a:off x="277709" y="3227140"/>
             <a:ext cx="5143979" cy="1283276"/>
           </a:xfrm>
           <a:prstGeom prst="rect">
@@ -6146,7 +6338,7 @@
         </p:nvSpPr>
         <p:spPr>
           <a:xfrm>
-            <a:off x="-68170" y="4458043"/>
+            <a:off x="-68170" y="4506169"/>
             <a:ext cx="3211515" cy="215444"/>
           </a:xfrm>
           <a:prstGeom prst="rect">
@@ -6198,7 +6390,7 @@
         </p:nvSpPr>
         <p:spPr>
           <a:xfrm>
-            <a:off x="2781059" y="4458043"/>
+            <a:off x="2781059" y="4506169"/>
             <a:ext cx="3211515" cy="215444"/>
           </a:xfrm>
           <a:prstGeom prst="rect">
@@ -6236,36 +6428,6 @@
           </a:p>
         </p:txBody>
       </p:sp>
-      <p:pic>
-        <p:nvPicPr>
-          <p:cNvPr id="8" name="Picture 7">
-            <a:extLst>
-              <a:ext uri="{FF2B5EF4-FFF2-40B4-BE49-F238E27FC236}">
-                <a16:creationId xmlns:a16="http://schemas.microsoft.com/office/drawing/2014/main" id="{8EA258E9-3AE0-B8D7-2611-9967ADB40271}"/>
-              </a:ext>
-            </a:extLst>
-          </p:cNvPr>
-          <p:cNvPicPr>
-            <a:picLocks noChangeAspect="1"/>
-          </p:cNvPicPr>
-          <p:nvPr/>
-        </p:nvPicPr>
-        <p:blipFill>
-          <a:blip r:embed="rId4"/>
-          <a:stretch>
-            <a:fillRect/>
-          </a:stretch>
-        </p:blipFill>
-        <p:spPr>
-          <a:xfrm>
-            <a:off x="277708" y="4647048"/>
-            <a:ext cx="5143979" cy="1283276"/>
-          </a:xfrm>
-          <a:prstGeom prst="rect">
-            <a:avLst/>
-          </a:prstGeom>
-        </p:spPr>
-      </p:pic>
       <p:sp>
         <p:nvSpPr>
           <p:cNvPr id="9" name="TextBox 8">
@@ -6280,7 +6442,7 @@
         </p:nvSpPr>
         <p:spPr>
           <a:xfrm>
-            <a:off x="-75992" y="4767838"/>
+            <a:off x="-75992" y="4815964"/>
             <a:ext cx="423514" cy="215444"/>
           </a:xfrm>
           <a:prstGeom prst="rect">
@@ -6357,7 +6519,7 @@
         </p:nvSpPr>
         <p:spPr>
           <a:xfrm>
-            <a:off x="-75992" y="4974324"/>
+            <a:off x="-75992" y="5022450"/>
             <a:ext cx="423514" cy="215444"/>
           </a:xfrm>
           <a:prstGeom prst="rect">
@@ -6434,7 +6596,7 @@
         </p:nvSpPr>
         <p:spPr>
           <a:xfrm>
-            <a:off x="-75992" y="5177252"/>
+            <a:off x="-75992" y="5225378"/>
             <a:ext cx="369012" cy="215444"/>
           </a:xfrm>
           <a:prstGeom prst="rect">
@@ -6511,7 +6673,7 @@
         </p:nvSpPr>
         <p:spPr>
           <a:xfrm>
-            <a:off x="-75992" y="5397970"/>
+            <a:off x="-75992" y="5446096"/>
             <a:ext cx="409086" cy="215444"/>
           </a:xfrm>
           <a:prstGeom prst="rect">
@@ -6588,7 +6750,7 @@
         </p:nvSpPr>
         <p:spPr>
           <a:xfrm>
-            <a:off x="-75992" y="5608014"/>
+            <a:off x="-75992" y="5656140"/>
             <a:ext cx="409086" cy="215444"/>
           </a:xfrm>
           <a:prstGeom prst="rect">
@@ -7435,7 +7597,7 @@
         </p:nvSpPr>
         <p:spPr>
           <a:xfrm>
-            <a:off x="-75992" y="3297761"/>
+            <a:off x="-75992" y="3345887"/>
             <a:ext cx="423514" cy="215444"/>
           </a:xfrm>
           <a:prstGeom prst="rect">
@@ -7512,7 +7674,7 @@
         </p:nvSpPr>
         <p:spPr>
           <a:xfrm>
-            <a:off x="-75992" y="3504247"/>
+            <a:off x="-75992" y="3552373"/>
             <a:ext cx="423514" cy="215444"/>
           </a:xfrm>
           <a:prstGeom prst="rect">
@@ -7589,7 +7751,7 @@
         </p:nvSpPr>
         <p:spPr>
           <a:xfrm>
-            <a:off x="-75992" y="3707175"/>
+            <a:off x="-75992" y="3755301"/>
             <a:ext cx="369012" cy="215444"/>
           </a:xfrm>
           <a:prstGeom prst="rect">
@@ -7666,7 +7828,7 @@
         </p:nvSpPr>
         <p:spPr>
           <a:xfrm>
-            <a:off x="-75992" y="3927893"/>
+            <a:off x="-75992" y="3976019"/>
             <a:ext cx="409086" cy="215444"/>
           </a:xfrm>
           <a:prstGeom prst="rect">
@@ -7743,7 +7905,7 @@
         </p:nvSpPr>
         <p:spPr>
           <a:xfrm>
-            <a:off x="-75992" y="4137937"/>
+            <a:off x="-75992" y="4186063"/>
             <a:ext cx="409086" cy="215444"/>
           </a:xfrm>
           <a:prstGeom prst="rect">
@@ -7800,6 +7962,1164 @@
                   <a:lumMod val="85000"/>
                   <a:lumOff val="15000"/>
                 </a:schemeClr>
+              </a:solidFill>
+              <a:latin typeface="Aptos" panose="020B0004020202020204" pitchFamily="34" charset="0"/>
+            </a:endParaRPr>
+          </a:p>
+        </p:txBody>
+      </p:sp>
+      <p:pic>
+        <p:nvPicPr>
+          <p:cNvPr id="2" name="Picture 1">
+            <a:extLst>
+              <a:ext uri="{FF2B5EF4-FFF2-40B4-BE49-F238E27FC236}">
+                <a16:creationId xmlns:a16="http://schemas.microsoft.com/office/drawing/2014/main" id="{A2DDA11B-F416-B74F-FC53-0DD17ED94431}"/>
+              </a:ext>
+            </a:extLst>
+          </p:cNvPr>
+          <p:cNvPicPr>
+            <a:picLocks noChangeAspect="1"/>
+          </p:cNvPicPr>
+          <p:nvPr/>
+        </p:nvPicPr>
+        <p:blipFill>
+          <a:blip r:embed="rId5"/>
+          <a:stretch>
+            <a:fillRect/>
+          </a:stretch>
+        </p:blipFill>
+        <p:spPr>
+          <a:xfrm>
+            <a:off x="270796" y="4673854"/>
+            <a:ext cx="5142812" cy="1281630"/>
+          </a:xfrm>
+          <a:prstGeom prst="rect">
+            <a:avLst/>
+          </a:prstGeom>
+        </p:spPr>
+      </p:pic>
+      <p:sp>
+        <p:nvSpPr>
+          <p:cNvPr id="5" name="TextBox 4">
+            <a:extLst>
+              <a:ext uri="{FF2B5EF4-FFF2-40B4-BE49-F238E27FC236}">
+                <a16:creationId xmlns:a16="http://schemas.microsoft.com/office/drawing/2014/main" id="{22235CFA-1295-6040-F0B1-6213F730566C}"/>
+              </a:ext>
+            </a:extLst>
+          </p:cNvPr>
+          <p:cNvSpPr txBox="1"/>
+          <p:nvPr/>
+        </p:nvSpPr>
+        <p:spPr>
+          <a:xfrm>
+            <a:off x="312056" y="3644606"/>
+            <a:ext cx="461986" cy="215444"/>
+          </a:xfrm>
+          <a:prstGeom prst="rect">
+            <a:avLst/>
+          </a:prstGeom>
+          <a:noFill/>
+        </p:spPr>
+        <p:txBody>
+          <a:bodyPr wrap="none" rtlCol="0">
+            <a:spAutoFit/>
+          </a:bodyPr>
+          <a:lstStyle/>
+          <a:p>
+            <a:pPr algn="r"/>
+            <a:r>
+              <a:rPr lang="en-US" sz="800" dirty="0">
+                <a:solidFill>
+                  <a:srgbClr val="1E90FF"/>
+                </a:solidFill>
+                <a:latin typeface="Aptos" panose="020B0004020202020204" pitchFamily="34" charset="0"/>
+              </a:rPr>
+              <a:t>3.47%</a:t>
+            </a:r>
+            <a:endParaRPr lang="en-GB" sz="800" dirty="0">
+              <a:solidFill>
+                <a:srgbClr val="1E90FF"/>
+              </a:solidFill>
+              <a:latin typeface="Aptos" panose="020B0004020202020204" pitchFamily="34" charset="0"/>
+            </a:endParaRPr>
+          </a:p>
+        </p:txBody>
+      </p:sp>
+      <p:sp>
+        <p:nvSpPr>
+          <p:cNvPr id="29" name="TextBox 28">
+            <a:extLst>
+              <a:ext uri="{FF2B5EF4-FFF2-40B4-BE49-F238E27FC236}">
+                <a16:creationId xmlns:a16="http://schemas.microsoft.com/office/drawing/2014/main" id="{DCCF35C2-2B4D-5E8A-977D-51474F934E5F}"/>
+              </a:ext>
+            </a:extLst>
+          </p:cNvPr>
+          <p:cNvSpPr txBox="1"/>
+          <p:nvPr/>
+        </p:nvSpPr>
+        <p:spPr>
+          <a:xfrm>
+            <a:off x="576428" y="4032865"/>
+            <a:ext cx="461986" cy="215444"/>
+          </a:xfrm>
+          <a:prstGeom prst="rect">
+            <a:avLst/>
+          </a:prstGeom>
+          <a:noFill/>
+        </p:spPr>
+        <p:txBody>
+          <a:bodyPr wrap="none" rtlCol="0">
+            <a:spAutoFit/>
+          </a:bodyPr>
+          <a:lstStyle/>
+          <a:p>
+            <a:pPr algn="r"/>
+            <a:r>
+              <a:rPr lang="en-US" sz="800" dirty="0">
+                <a:solidFill>
+                  <a:srgbClr val="1E90FF"/>
+                </a:solidFill>
+                <a:latin typeface="Aptos" panose="020B0004020202020204" pitchFamily="34" charset="0"/>
+              </a:rPr>
+              <a:t>3.33%</a:t>
+            </a:r>
+            <a:endParaRPr lang="en-GB" sz="800" dirty="0">
+              <a:solidFill>
+                <a:srgbClr val="1E90FF"/>
+              </a:solidFill>
+              <a:latin typeface="Aptos" panose="020B0004020202020204" pitchFamily="34" charset="0"/>
+            </a:endParaRPr>
+          </a:p>
+        </p:txBody>
+      </p:sp>
+      <p:sp>
+        <p:nvSpPr>
+          <p:cNvPr id="30" name="TextBox 29">
+            <a:extLst>
+              <a:ext uri="{FF2B5EF4-FFF2-40B4-BE49-F238E27FC236}">
+                <a16:creationId xmlns:a16="http://schemas.microsoft.com/office/drawing/2014/main" id="{8AB7F894-0E98-5152-5E16-DE12099F8A67}"/>
+              </a:ext>
+            </a:extLst>
+          </p:cNvPr>
+          <p:cNvSpPr txBox="1"/>
+          <p:nvPr/>
+        </p:nvSpPr>
+        <p:spPr>
+          <a:xfrm>
+            <a:off x="1038414" y="3601875"/>
+            <a:ext cx="461986" cy="215444"/>
+          </a:xfrm>
+          <a:prstGeom prst="rect">
+            <a:avLst/>
+          </a:prstGeom>
+          <a:noFill/>
+        </p:spPr>
+        <p:txBody>
+          <a:bodyPr wrap="none" rtlCol="0">
+            <a:spAutoFit/>
+          </a:bodyPr>
+          <a:lstStyle/>
+          <a:p>
+            <a:pPr algn="r"/>
+            <a:r>
+              <a:rPr lang="en-US" sz="800" dirty="0">
+                <a:solidFill>
+                  <a:srgbClr val="1E90FF"/>
+                </a:solidFill>
+                <a:latin typeface="Aptos" panose="020B0004020202020204" pitchFamily="34" charset="0"/>
+              </a:rPr>
+              <a:t>1.55%</a:t>
+            </a:r>
+            <a:endParaRPr lang="en-GB" sz="800" dirty="0">
+              <a:solidFill>
+                <a:srgbClr val="1E90FF"/>
+              </a:solidFill>
+              <a:latin typeface="Aptos" panose="020B0004020202020204" pitchFamily="34" charset="0"/>
+            </a:endParaRPr>
+          </a:p>
+        </p:txBody>
+      </p:sp>
+      <p:sp>
+        <p:nvSpPr>
+          <p:cNvPr id="31" name="TextBox 30">
+            <a:extLst>
+              <a:ext uri="{FF2B5EF4-FFF2-40B4-BE49-F238E27FC236}">
+                <a16:creationId xmlns:a16="http://schemas.microsoft.com/office/drawing/2014/main" id="{CD34C7D8-FB8C-8E4E-6E9C-C545B9C9B706}"/>
+              </a:ext>
+            </a:extLst>
+          </p:cNvPr>
+          <p:cNvSpPr txBox="1"/>
+          <p:nvPr/>
+        </p:nvSpPr>
+        <p:spPr>
+          <a:xfrm>
+            <a:off x="1248160" y="4032865"/>
+            <a:ext cx="461986" cy="215444"/>
+          </a:xfrm>
+          <a:prstGeom prst="rect">
+            <a:avLst/>
+          </a:prstGeom>
+          <a:noFill/>
+        </p:spPr>
+        <p:txBody>
+          <a:bodyPr wrap="none" rtlCol="0">
+            <a:spAutoFit/>
+          </a:bodyPr>
+          <a:lstStyle/>
+          <a:p>
+            <a:pPr algn="r"/>
+            <a:r>
+              <a:rPr lang="en-US" sz="800" dirty="0">
+                <a:solidFill>
+                  <a:srgbClr val="1E90FF"/>
+                </a:solidFill>
+                <a:latin typeface="Aptos" panose="020B0004020202020204" pitchFamily="34" charset="0"/>
+              </a:rPr>
+              <a:t>3.54%</a:t>
+            </a:r>
+            <a:endParaRPr lang="en-GB" sz="800" dirty="0">
+              <a:solidFill>
+                <a:srgbClr val="1E90FF"/>
+              </a:solidFill>
+              <a:latin typeface="Aptos" panose="020B0004020202020204" pitchFamily="34" charset="0"/>
+            </a:endParaRPr>
+          </a:p>
+        </p:txBody>
+      </p:sp>
+      <p:sp>
+        <p:nvSpPr>
+          <p:cNvPr id="32" name="TextBox 31">
+            <a:extLst>
+              <a:ext uri="{FF2B5EF4-FFF2-40B4-BE49-F238E27FC236}">
+                <a16:creationId xmlns:a16="http://schemas.microsoft.com/office/drawing/2014/main" id="{920CA514-37F8-ABA1-0480-39805F95E26D}"/>
+              </a:ext>
+            </a:extLst>
+          </p:cNvPr>
+          <p:cNvSpPr txBox="1"/>
+          <p:nvPr/>
+        </p:nvSpPr>
+        <p:spPr>
+          <a:xfrm>
+            <a:off x="2424463" y="3657997"/>
+            <a:ext cx="461986" cy="215444"/>
+          </a:xfrm>
+          <a:prstGeom prst="rect">
+            <a:avLst/>
+          </a:prstGeom>
+          <a:noFill/>
+        </p:spPr>
+        <p:txBody>
+          <a:bodyPr wrap="none" rtlCol="0">
+            <a:spAutoFit/>
+          </a:bodyPr>
+          <a:lstStyle/>
+          <a:p>
+            <a:pPr algn="r"/>
+            <a:r>
+              <a:rPr lang="en-US" sz="800" dirty="0">
+                <a:solidFill>
+                  <a:srgbClr val="1E90FF"/>
+                </a:solidFill>
+                <a:latin typeface="Aptos" panose="020B0004020202020204" pitchFamily="34" charset="0"/>
+              </a:rPr>
+              <a:t>3.94%</a:t>
+            </a:r>
+            <a:endParaRPr lang="en-GB" sz="800" dirty="0">
+              <a:solidFill>
+                <a:srgbClr val="1E90FF"/>
+              </a:solidFill>
+              <a:latin typeface="Aptos" panose="020B0004020202020204" pitchFamily="34" charset="0"/>
+            </a:endParaRPr>
+          </a:p>
+        </p:txBody>
+      </p:sp>
+      <p:sp>
+        <p:nvSpPr>
+          <p:cNvPr id="33" name="TextBox 32">
+            <a:extLst>
+              <a:ext uri="{FF2B5EF4-FFF2-40B4-BE49-F238E27FC236}">
+                <a16:creationId xmlns:a16="http://schemas.microsoft.com/office/drawing/2014/main" id="{0C330A33-6E45-0048-8D6D-D89BFDF4C1CF}"/>
+              </a:ext>
+            </a:extLst>
+          </p:cNvPr>
+          <p:cNvSpPr txBox="1"/>
+          <p:nvPr/>
+        </p:nvSpPr>
+        <p:spPr>
+          <a:xfrm>
+            <a:off x="1976943" y="4083741"/>
+            <a:ext cx="461986" cy="215444"/>
+          </a:xfrm>
+          <a:prstGeom prst="rect">
+            <a:avLst/>
+          </a:prstGeom>
+          <a:noFill/>
+        </p:spPr>
+        <p:txBody>
+          <a:bodyPr wrap="none" rtlCol="0">
+            <a:spAutoFit/>
+          </a:bodyPr>
+          <a:lstStyle/>
+          <a:p>
+            <a:pPr algn="r"/>
+            <a:r>
+              <a:rPr lang="en-US" sz="800" dirty="0">
+                <a:solidFill>
+                  <a:srgbClr val="1E90FF"/>
+                </a:solidFill>
+                <a:latin typeface="Aptos" panose="020B0004020202020204" pitchFamily="34" charset="0"/>
+              </a:rPr>
+              <a:t>4.27%</a:t>
+            </a:r>
+            <a:endParaRPr lang="en-GB" sz="800" dirty="0">
+              <a:solidFill>
+                <a:srgbClr val="1E90FF"/>
+              </a:solidFill>
+              <a:latin typeface="Aptos" panose="020B0004020202020204" pitchFamily="34" charset="0"/>
+            </a:endParaRPr>
+          </a:p>
+        </p:txBody>
+      </p:sp>
+      <p:sp>
+        <p:nvSpPr>
+          <p:cNvPr id="34" name="TextBox 33">
+            <a:extLst>
+              <a:ext uri="{FF2B5EF4-FFF2-40B4-BE49-F238E27FC236}">
+                <a16:creationId xmlns:a16="http://schemas.microsoft.com/office/drawing/2014/main" id="{EF0F9FEF-8958-6B24-2572-774155AC86FB}"/>
+              </a:ext>
+            </a:extLst>
+          </p:cNvPr>
+          <p:cNvSpPr txBox="1"/>
+          <p:nvPr/>
+        </p:nvSpPr>
+        <p:spPr>
+          <a:xfrm>
+            <a:off x="2886449" y="3621136"/>
+            <a:ext cx="461986" cy="215444"/>
+          </a:xfrm>
+          <a:prstGeom prst="rect">
+            <a:avLst/>
+          </a:prstGeom>
+          <a:noFill/>
+        </p:spPr>
+        <p:txBody>
+          <a:bodyPr wrap="none" rtlCol="0">
+            <a:spAutoFit/>
+          </a:bodyPr>
+          <a:lstStyle/>
+          <a:p>
+            <a:pPr algn="r"/>
+            <a:r>
+              <a:rPr lang="en-US" sz="800" dirty="0">
+                <a:solidFill>
+                  <a:srgbClr val="1E90FF"/>
+                </a:solidFill>
+                <a:latin typeface="Aptos" panose="020B0004020202020204" pitchFamily="34" charset="0"/>
+              </a:rPr>
+              <a:t>5.78%</a:t>
+            </a:r>
+            <a:endParaRPr lang="en-GB" sz="800" dirty="0">
+              <a:solidFill>
+                <a:srgbClr val="1E90FF"/>
+              </a:solidFill>
+              <a:latin typeface="Aptos" panose="020B0004020202020204" pitchFamily="34" charset="0"/>
+            </a:endParaRPr>
+          </a:p>
+        </p:txBody>
+      </p:sp>
+      <p:sp>
+        <p:nvSpPr>
+          <p:cNvPr id="35" name="TextBox 34">
+            <a:extLst>
+              <a:ext uri="{FF2B5EF4-FFF2-40B4-BE49-F238E27FC236}">
+                <a16:creationId xmlns:a16="http://schemas.microsoft.com/office/drawing/2014/main" id="{A0BC7F93-A6C9-6A77-0154-0FE7F7743B0D}"/>
+              </a:ext>
+            </a:extLst>
+          </p:cNvPr>
+          <p:cNvSpPr txBox="1"/>
+          <p:nvPr/>
+        </p:nvSpPr>
+        <p:spPr>
+          <a:xfrm>
+            <a:off x="3166237" y="4027272"/>
+            <a:ext cx="461986" cy="215444"/>
+          </a:xfrm>
+          <a:prstGeom prst="rect">
+            <a:avLst/>
+          </a:prstGeom>
+          <a:noFill/>
+        </p:spPr>
+        <p:txBody>
+          <a:bodyPr wrap="none" rtlCol="0">
+            <a:spAutoFit/>
+          </a:bodyPr>
+          <a:lstStyle/>
+          <a:p>
+            <a:pPr algn="r"/>
+            <a:r>
+              <a:rPr lang="en-US" sz="800" dirty="0">
+                <a:solidFill>
+                  <a:srgbClr val="1E90FF"/>
+                </a:solidFill>
+                <a:latin typeface="Aptos" panose="020B0004020202020204" pitchFamily="34" charset="0"/>
+              </a:rPr>
+              <a:t>7.67%</a:t>
+            </a:r>
+            <a:endParaRPr lang="en-GB" sz="800" dirty="0">
+              <a:solidFill>
+                <a:srgbClr val="1E90FF"/>
+              </a:solidFill>
+              <a:latin typeface="Aptos" panose="020B0004020202020204" pitchFamily="34" charset="0"/>
+            </a:endParaRPr>
+          </a:p>
+        </p:txBody>
+      </p:sp>
+      <p:sp>
+        <p:nvSpPr>
+          <p:cNvPr id="36" name="TextBox 35">
+            <a:extLst>
+              <a:ext uri="{FF2B5EF4-FFF2-40B4-BE49-F238E27FC236}">
+                <a16:creationId xmlns:a16="http://schemas.microsoft.com/office/drawing/2014/main" id="{F66BA967-1449-B19C-3664-D56311A4881C}"/>
+              </a:ext>
+            </a:extLst>
+          </p:cNvPr>
+          <p:cNvSpPr txBox="1"/>
+          <p:nvPr/>
+        </p:nvSpPr>
+        <p:spPr>
+          <a:xfrm>
+            <a:off x="3609094" y="3610576"/>
+            <a:ext cx="461986" cy="215444"/>
+          </a:xfrm>
+          <a:prstGeom prst="rect">
+            <a:avLst/>
+          </a:prstGeom>
+          <a:noFill/>
+        </p:spPr>
+        <p:txBody>
+          <a:bodyPr wrap="none" rtlCol="0">
+            <a:spAutoFit/>
+          </a:bodyPr>
+          <a:lstStyle/>
+          <a:p>
+            <a:pPr algn="r"/>
+            <a:r>
+              <a:rPr lang="en-US" sz="800" dirty="0">
+                <a:solidFill>
+                  <a:srgbClr val="1E90FF"/>
+                </a:solidFill>
+                <a:latin typeface="Aptos" panose="020B0004020202020204" pitchFamily="34" charset="0"/>
+              </a:rPr>
+              <a:t>3.16%</a:t>
+            </a:r>
+            <a:endParaRPr lang="en-GB" sz="800" dirty="0">
+              <a:solidFill>
+                <a:srgbClr val="1E90FF"/>
+              </a:solidFill>
+              <a:latin typeface="Aptos" panose="020B0004020202020204" pitchFamily="34" charset="0"/>
+            </a:endParaRPr>
+          </a:p>
+        </p:txBody>
+      </p:sp>
+      <p:sp>
+        <p:nvSpPr>
+          <p:cNvPr id="37" name="TextBox 36">
+            <a:extLst>
+              <a:ext uri="{FF2B5EF4-FFF2-40B4-BE49-F238E27FC236}">
+                <a16:creationId xmlns:a16="http://schemas.microsoft.com/office/drawing/2014/main" id="{B27B5B8C-FA50-B6E2-F0C4-92CF47BDE12E}"/>
+              </a:ext>
+            </a:extLst>
+          </p:cNvPr>
+          <p:cNvSpPr txBox="1"/>
+          <p:nvPr/>
+        </p:nvSpPr>
+        <p:spPr>
+          <a:xfrm>
+            <a:off x="3819066" y="4035629"/>
+            <a:ext cx="461986" cy="215444"/>
+          </a:xfrm>
+          <a:prstGeom prst="rect">
+            <a:avLst/>
+          </a:prstGeom>
+          <a:noFill/>
+        </p:spPr>
+        <p:txBody>
+          <a:bodyPr wrap="none" rtlCol="0">
+            <a:spAutoFit/>
+          </a:bodyPr>
+          <a:lstStyle/>
+          <a:p>
+            <a:pPr algn="r"/>
+            <a:r>
+              <a:rPr lang="en-US" sz="800" dirty="0">
+                <a:solidFill>
+                  <a:srgbClr val="1E90FF"/>
+                </a:solidFill>
+                <a:latin typeface="Aptos" panose="020B0004020202020204" pitchFamily="34" charset="0"/>
+              </a:rPr>
+              <a:t>5.31%</a:t>
+            </a:r>
+            <a:endParaRPr lang="en-GB" sz="800" dirty="0">
+              <a:solidFill>
+                <a:srgbClr val="1E90FF"/>
+              </a:solidFill>
+              <a:latin typeface="Aptos" panose="020B0004020202020204" pitchFamily="34" charset="0"/>
+            </a:endParaRPr>
+          </a:p>
+        </p:txBody>
+      </p:sp>
+      <p:sp>
+        <p:nvSpPr>
+          <p:cNvPr id="38" name="TextBox 37">
+            <a:extLst>
+              <a:ext uri="{FF2B5EF4-FFF2-40B4-BE49-F238E27FC236}">
+                <a16:creationId xmlns:a16="http://schemas.microsoft.com/office/drawing/2014/main" id="{184115E0-3246-EC3D-9C4E-742642B3440E}"/>
+              </a:ext>
+            </a:extLst>
+          </p:cNvPr>
+          <p:cNvSpPr txBox="1"/>
+          <p:nvPr/>
+        </p:nvSpPr>
+        <p:spPr>
+          <a:xfrm>
+            <a:off x="5014152" y="3657997"/>
+            <a:ext cx="461986" cy="215444"/>
+          </a:xfrm>
+          <a:prstGeom prst="rect">
+            <a:avLst/>
+          </a:prstGeom>
+          <a:noFill/>
+        </p:spPr>
+        <p:txBody>
+          <a:bodyPr wrap="none" rtlCol="0">
+            <a:spAutoFit/>
+          </a:bodyPr>
+          <a:lstStyle/>
+          <a:p>
+            <a:pPr algn="r"/>
+            <a:r>
+              <a:rPr lang="en-US" sz="800" dirty="0">
+                <a:solidFill>
+                  <a:srgbClr val="1E90FF"/>
+                </a:solidFill>
+                <a:latin typeface="Aptos" panose="020B0004020202020204" pitchFamily="34" charset="0"/>
+              </a:rPr>
+              <a:t>5.61%</a:t>
+            </a:r>
+            <a:endParaRPr lang="en-GB" sz="800" dirty="0">
+              <a:solidFill>
+                <a:srgbClr val="1E90FF"/>
+              </a:solidFill>
+              <a:latin typeface="Aptos" panose="020B0004020202020204" pitchFamily="34" charset="0"/>
+            </a:endParaRPr>
+          </a:p>
+        </p:txBody>
+      </p:sp>
+      <p:sp>
+        <p:nvSpPr>
+          <p:cNvPr id="39" name="TextBox 38">
+            <a:extLst>
+              <a:ext uri="{FF2B5EF4-FFF2-40B4-BE49-F238E27FC236}">
+                <a16:creationId xmlns:a16="http://schemas.microsoft.com/office/drawing/2014/main" id="{5303C2B2-76E3-B734-E776-20F68CE1A725}"/>
+              </a:ext>
+            </a:extLst>
+          </p:cNvPr>
+          <p:cNvSpPr txBox="1"/>
+          <p:nvPr/>
+        </p:nvSpPr>
+        <p:spPr>
+          <a:xfrm>
+            <a:off x="4556156" y="4082083"/>
+            <a:ext cx="461986" cy="215444"/>
+          </a:xfrm>
+          <a:prstGeom prst="rect">
+            <a:avLst/>
+          </a:prstGeom>
+          <a:noFill/>
+        </p:spPr>
+        <p:txBody>
+          <a:bodyPr wrap="none" rtlCol="0">
+            <a:spAutoFit/>
+          </a:bodyPr>
+          <a:lstStyle/>
+          <a:p>
+            <a:pPr algn="r"/>
+            <a:r>
+              <a:rPr lang="en-US" sz="800" dirty="0">
+                <a:solidFill>
+                  <a:srgbClr val="1E90FF"/>
+                </a:solidFill>
+                <a:latin typeface="Aptos" panose="020B0004020202020204" pitchFamily="34" charset="0"/>
+              </a:rPr>
+              <a:t>8.13%</a:t>
+            </a:r>
+            <a:endParaRPr lang="en-GB" sz="800" dirty="0">
+              <a:solidFill>
+                <a:srgbClr val="1E90FF"/>
+              </a:solidFill>
+              <a:latin typeface="Aptos" panose="020B0004020202020204" pitchFamily="34" charset="0"/>
+            </a:endParaRPr>
+          </a:p>
+        </p:txBody>
+      </p:sp>
+      <p:sp>
+        <p:nvSpPr>
+          <p:cNvPr id="40" name="TextBox 39">
+            <a:extLst>
+              <a:ext uri="{FF2B5EF4-FFF2-40B4-BE49-F238E27FC236}">
+                <a16:creationId xmlns:a16="http://schemas.microsoft.com/office/drawing/2014/main" id="{DF0CC77A-0C8F-A9D9-BDAD-CD3E33DCB230}"/>
+              </a:ext>
+            </a:extLst>
+          </p:cNvPr>
+          <p:cNvSpPr txBox="1"/>
+          <p:nvPr/>
+        </p:nvSpPr>
+        <p:spPr>
+          <a:xfrm>
+            <a:off x="2822757" y="5100132"/>
+            <a:ext cx="516488" cy="215444"/>
+          </a:xfrm>
+          <a:prstGeom prst="rect">
+            <a:avLst/>
+          </a:prstGeom>
+          <a:noFill/>
+        </p:spPr>
+        <p:txBody>
+          <a:bodyPr wrap="none" rtlCol="0">
+            <a:spAutoFit/>
+          </a:bodyPr>
+          <a:lstStyle/>
+          <a:p>
+            <a:pPr algn="r"/>
+            <a:r>
+              <a:rPr lang="en-US" sz="800" dirty="0">
+                <a:solidFill>
+                  <a:srgbClr val="1E90FF"/>
+                </a:solidFill>
+                <a:latin typeface="Aptos" panose="020B0004020202020204" pitchFamily="34" charset="0"/>
+              </a:rPr>
+              <a:t>67.63%</a:t>
+            </a:r>
+            <a:endParaRPr lang="en-GB" sz="800" dirty="0">
+              <a:solidFill>
+                <a:srgbClr val="1E90FF"/>
+              </a:solidFill>
+              <a:latin typeface="Aptos" panose="020B0004020202020204" pitchFamily="34" charset="0"/>
+            </a:endParaRPr>
+          </a:p>
+        </p:txBody>
+      </p:sp>
+      <p:sp>
+        <p:nvSpPr>
+          <p:cNvPr id="41" name="TextBox 40">
+            <a:extLst>
+              <a:ext uri="{FF2B5EF4-FFF2-40B4-BE49-F238E27FC236}">
+                <a16:creationId xmlns:a16="http://schemas.microsoft.com/office/drawing/2014/main" id="{07C4EFFF-CB25-B85A-0629-7430E6F783E2}"/>
+              </a:ext>
+            </a:extLst>
+          </p:cNvPr>
+          <p:cNvSpPr txBox="1"/>
+          <p:nvPr/>
+        </p:nvSpPr>
+        <p:spPr>
+          <a:xfrm>
+            <a:off x="2948379" y="5325488"/>
+            <a:ext cx="516488" cy="215444"/>
+          </a:xfrm>
+          <a:prstGeom prst="rect">
+            <a:avLst/>
+          </a:prstGeom>
+          <a:noFill/>
+        </p:spPr>
+        <p:txBody>
+          <a:bodyPr wrap="none" rtlCol="0">
+            <a:spAutoFit/>
+          </a:bodyPr>
+          <a:lstStyle/>
+          <a:p>
+            <a:pPr algn="r"/>
+            <a:r>
+              <a:rPr lang="en-US" sz="800" dirty="0">
+                <a:solidFill>
+                  <a:srgbClr val="1E90FF"/>
+                </a:solidFill>
+                <a:latin typeface="Aptos" panose="020B0004020202020204" pitchFamily="34" charset="0"/>
+              </a:rPr>
+              <a:t>46.00%</a:t>
+            </a:r>
+            <a:endParaRPr lang="en-GB" sz="800" dirty="0">
+              <a:solidFill>
+                <a:srgbClr val="1E90FF"/>
+              </a:solidFill>
+              <a:latin typeface="Aptos" panose="020B0004020202020204" pitchFamily="34" charset="0"/>
+            </a:endParaRPr>
+          </a:p>
+        </p:txBody>
+      </p:sp>
+      <p:sp>
+        <p:nvSpPr>
+          <p:cNvPr id="42" name="TextBox 41">
+            <a:extLst>
+              <a:ext uri="{FF2B5EF4-FFF2-40B4-BE49-F238E27FC236}">
+                <a16:creationId xmlns:a16="http://schemas.microsoft.com/office/drawing/2014/main" id="{18EC3451-6E8A-D526-C3F6-0701D3FC74A7}"/>
+              </a:ext>
+            </a:extLst>
+          </p:cNvPr>
+          <p:cNvSpPr txBox="1"/>
+          <p:nvPr/>
+        </p:nvSpPr>
+        <p:spPr>
+          <a:xfrm>
+            <a:off x="3545625" y="5032887"/>
+            <a:ext cx="516488" cy="215444"/>
+          </a:xfrm>
+          <a:prstGeom prst="rect">
+            <a:avLst/>
+          </a:prstGeom>
+          <a:noFill/>
+        </p:spPr>
+        <p:txBody>
+          <a:bodyPr wrap="none" rtlCol="0">
+            <a:spAutoFit/>
+          </a:bodyPr>
+          <a:lstStyle/>
+          <a:p>
+            <a:pPr algn="r"/>
+            <a:r>
+              <a:rPr lang="en-US" sz="800" dirty="0">
+                <a:solidFill>
+                  <a:srgbClr val="1E90FF"/>
+                </a:solidFill>
+                <a:latin typeface="Aptos" panose="020B0004020202020204" pitchFamily="34" charset="0"/>
+              </a:rPr>
+              <a:t>65.14%</a:t>
+            </a:r>
+            <a:endParaRPr lang="en-GB" sz="800" dirty="0">
+              <a:solidFill>
+                <a:srgbClr val="1E90FF"/>
+              </a:solidFill>
+              <a:latin typeface="Aptos" panose="020B0004020202020204" pitchFamily="34" charset="0"/>
+            </a:endParaRPr>
+          </a:p>
+        </p:txBody>
+      </p:sp>
+      <p:sp>
+        <p:nvSpPr>
+          <p:cNvPr id="43" name="TextBox 42">
+            <a:extLst>
+              <a:ext uri="{FF2B5EF4-FFF2-40B4-BE49-F238E27FC236}">
+                <a16:creationId xmlns:a16="http://schemas.microsoft.com/office/drawing/2014/main" id="{72FAAEA1-A1D8-9538-DD5E-664B48510042}"/>
+              </a:ext>
+            </a:extLst>
+          </p:cNvPr>
+          <p:cNvSpPr txBox="1"/>
+          <p:nvPr/>
+        </p:nvSpPr>
+        <p:spPr>
+          <a:xfrm>
+            <a:off x="3791815" y="5469706"/>
+            <a:ext cx="516488" cy="215444"/>
+          </a:xfrm>
+          <a:prstGeom prst="rect">
+            <a:avLst/>
+          </a:prstGeom>
+          <a:noFill/>
+        </p:spPr>
+        <p:txBody>
+          <a:bodyPr wrap="none" rtlCol="0">
+            <a:spAutoFit/>
+          </a:bodyPr>
+          <a:lstStyle/>
+          <a:p>
+            <a:pPr algn="r"/>
+            <a:r>
+              <a:rPr lang="en-US" sz="800" dirty="0">
+                <a:solidFill>
+                  <a:srgbClr val="1E90FF"/>
+                </a:solidFill>
+                <a:latin typeface="Aptos" panose="020B0004020202020204" pitchFamily="34" charset="0"/>
+              </a:rPr>
+              <a:t>37.76%</a:t>
+            </a:r>
+            <a:endParaRPr lang="en-GB" sz="800" dirty="0">
+              <a:solidFill>
+                <a:srgbClr val="1E90FF"/>
+              </a:solidFill>
+              <a:latin typeface="Aptos" panose="020B0004020202020204" pitchFamily="34" charset="0"/>
+            </a:endParaRPr>
+          </a:p>
+        </p:txBody>
+      </p:sp>
+      <p:sp>
+        <p:nvSpPr>
+          <p:cNvPr id="44" name="TextBox 43">
+            <a:extLst>
+              <a:ext uri="{FF2B5EF4-FFF2-40B4-BE49-F238E27FC236}">
+                <a16:creationId xmlns:a16="http://schemas.microsoft.com/office/drawing/2014/main" id="{18B7E8BF-6040-2634-0A69-A07848E46CF0}"/>
+              </a:ext>
+            </a:extLst>
+          </p:cNvPr>
+          <p:cNvSpPr txBox="1"/>
+          <p:nvPr/>
+        </p:nvSpPr>
+        <p:spPr>
+          <a:xfrm>
+            <a:off x="4950092" y="5116846"/>
+            <a:ext cx="516488" cy="215444"/>
+          </a:xfrm>
+          <a:prstGeom prst="rect">
+            <a:avLst/>
+          </a:prstGeom>
+          <a:noFill/>
+        </p:spPr>
+        <p:txBody>
+          <a:bodyPr wrap="none" rtlCol="0">
+            <a:spAutoFit/>
+          </a:bodyPr>
+          <a:lstStyle/>
+          <a:p>
+            <a:pPr algn="r"/>
+            <a:r>
+              <a:rPr lang="en-US" sz="800" dirty="0">
+                <a:solidFill>
+                  <a:srgbClr val="1E90FF"/>
+                </a:solidFill>
+                <a:latin typeface="Aptos" panose="020B0004020202020204" pitchFamily="34" charset="0"/>
+              </a:rPr>
+              <a:t>61.79%</a:t>
+            </a:r>
+            <a:endParaRPr lang="en-GB" sz="800" dirty="0">
+              <a:solidFill>
+                <a:srgbClr val="1E90FF"/>
+              </a:solidFill>
+              <a:latin typeface="Aptos" panose="020B0004020202020204" pitchFamily="34" charset="0"/>
+            </a:endParaRPr>
+          </a:p>
+        </p:txBody>
+      </p:sp>
+      <p:sp>
+        <p:nvSpPr>
+          <p:cNvPr id="45" name="TextBox 44">
+            <a:extLst>
+              <a:ext uri="{FF2B5EF4-FFF2-40B4-BE49-F238E27FC236}">
+                <a16:creationId xmlns:a16="http://schemas.microsoft.com/office/drawing/2014/main" id="{49844F99-8226-C4FF-3803-07BFB4CA2ACD}"/>
+              </a:ext>
+            </a:extLst>
+          </p:cNvPr>
+          <p:cNvSpPr txBox="1"/>
+          <p:nvPr/>
+        </p:nvSpPr>
+        <p:spPr>
+          <a:xfrm>
+            <a:off x="4468627" y="5543487"/>
+            <a:ext cx="516488" cy="215444"/>
+          </a:xfrm>
+          <a:prstGeom prst="rect">
+            <a:avLst/>
+          </a:prstGeom>
+          <a:noFill/>
+        </p:spPr>
+        <p:txBody>
+          <a:bodyPr wrap="none" rtlCol="0">
+            <a:spAutoFit/>
+          </a:bodyPr>
+          <a:lstStyle/>
+          <a:p>
+            <a:pPr algn="r"/>
+            <a:r>
+              <a:rPr lang="en-US" sz="800" dirty="0">
+                <a:solidFill>
+                  <a:srgbClr val="1E90FF"/>
+                </a:solidFill>
+                <a:latin typeface="Aptos" panose="020B0004020202020204" pitchFamily="34" charset="0"/>
+              </a:rPr>
+              <a:t>69.56%</a:t>
+            </a:r>
+            <a:endParaRPr lang="en-GB" sz="800" dirty="0">
+              <a:solidFill>
+                <a:srgbClr val="1E90FF"/>
+              </a:solidFill>
+              <a:latin typeface="Aptos" panose="020B0004020202020204" pitchFamily="34" charset="0"/>
+            </a:endParaRPr>
+          </a:p>
+        </p:txBody>
+      </p:sp>
+      <p:sp>
+        <p:nvSpPr>
+          <p:cNvPr id="46" name="TextBox 45">
+            <a:extLst>
+              <a:ext uri="{FF2B5EF4-FFF2-40B4-BE49-F238E27FC236}">
+                <a16:creationId xmlns:a16="http://schemas.microsoft.com/office/drawing/2014/main" id="{54C9AA82-B1DD-CE17-438B-285683A2A7D4}"/>
+              </a:ext>
+            </a:extLst>
+          </p:cNvPr>
+          <p:cNvSpPr txBox="1"/>
+          <p:nvPr/>
+        </p:nvSpPr>
+        <p:spPr>
+          <a:xfrm>
+            <a:off x="285397" y="5058259"/>
+            <a:ext cx="461986" cy="215444"/>
+          </a:xfrm>
+          <a:prstGeom prst="rect">
+            <a:avLst/>
+          </a:prstGeom>
+          <a:noFill/>
+        </p:spPr>
+        <p:txBody>
+          <a:bodyPr wrap="none" rtlCol="0">
+            <a:spAutoFit/>
+          </a:bodyPr>
+          <a:lstStyle/>
+          <a:p>
+            <a:pPr algn="r"/>
+            <a:r>
+              <a:rPr lang="en-US" sz="800" dirty="0">
+                <a:solidFill>
+                  <a:srgbClr val="1E90FF"/>
+                </a:solidFill>
+                <a:latin typeface="Aptos" panose="020B0004020202020204" pitchFamily="34" charset="0"/>
+              </a:rPr>
+              <a:t>7.51%</a:t>
+            </a:r>
+            <a:endParaRPr lang="en-GB" sz="800" dirty="0">
+              <a:solidFill>
+                <a:srgbClr val="1E90FF"/>
+              </a:solidFill>
+              <a:latin typeface="Aptos" panose="020B0004020202020204" pitchFamily="34" charset="0"/>
+            </a:endParaRPr>
+          </a:p>
+        </p:txBody>
+      </p:sp>
+      <p:sp>
+        <p:nvSpPr>
+          <p:cNvPr id="47" name="TextBox 46">
+            <a:extLst>
+              <a:ext uri="{FF2B5EF4-FFF2-40B4-BE49-F238E27FC236}">
+                <a16:creationId xmlns:a16="http://schemas.microsoft.com/office/drawing/2014/main" id="{E2E1CB9F-196C-A33A-3488-DA8464A46012}"/>
+              </a:ext>
+            </a:extLst>
+          </p:cNvPr>
+          <p:cNvSpPr txBox="1"/>
+          <p:nvPr/>
+        </p:nvSpPr>
+        <p:spPr>
+          <a:xfrm>
+            <a:off x="582941" y="5468119"/>
+            <a:ext cx="461986" cy="215444"/>
+          </a:xfrm>
+          <a:prstGeom prst="rect">
+            <a:avLst/>
+          </a:prstGeom>
+          <a:noFill/>
+        </p:spPr>
+        <p:txBody>
+          <a:bodyPr wrap="none" rtlCol="0">
+            <a:spAutoFit/>
+          </a:bodyPr>
+          <a:lstStyle/>
+          <a:p>
+            <a:pPr algn="r"/>
+            <a:r>
+              <a:rPr lang="en-US" sz="800" dirty="0">
+                <a:solidFill>
+                  <a:srgbClr val="1E90FF"/>
+                </a:solidFill>
+                <a:latin typeface="Aptos" panose="020B0004020202020204" pitchFamily="34" charset="0"/>
+              </a:rPr>
+              <a:t>2.33%</a:t>
+            </a:r>
+            <a:endParaRPr lang="en-GB" sz="800" dirty="0">
+              <a:solidFill>
+                <a:srgbClr val="1E90FF"/>
+              </a:solidFill>
+              <a:latin typeface="Aptos" panose="020B0004020202020204" pitchFamily="34" charset="0"/>
+            </a:endParaRPr>
+          </a:p>
+        </p:txBody>
+      </p:sp>
+      <p:sp>
+        <p:nvSpPr>
+          <p:cNvPr id="48" name="TextBox 47">
+            <a:extLst>
+              <a:ext uri="{FF2B5EF4-FFF2-40B4-BE49-F238E27FC236}">
+                <a16:creationId xmlns:a16="http://schemas.microsoft.com/office/drawing/2014/main" id="{2ECFB7EF-0139-0B74-8D42-119F3A295EB2}"/>
+              </a:ext>
+            </a:extLst>
+          </p:cNvPr>
+          <p:cNvSpPr txBox="1"/>
+          <p:nvPr/>
+        </p:nvSpPr>
+        <p:spPr>
+          <a:xfrm>
+            <a:off x="1017167" y="5031408"/>
+            <a:ext cx="461986" cy="215444"/>
+          </a:xfrm>
+          <a:prstGeom prst="rect">
+            <a:avLst/>
+          </a:prstGeom>
+          <a:noFill/>
+        </p:spPr>
+        <p:txBody>
+          <a:bodyPr wrap="none" rtlCol="0">
+            <a:spAutoFit/>
+          </a:bodyPr>
+          <a:lstStyle/>
+          <a:p>
+            <a:pPr algn="r"/>
+            <a:r>
+              <a:rPr lang="en-US" sz="800" dirty="0">
+                <a:solidFill>
+                  <a:srgbClr val="1E90FF"/>
+                </a:solidFill>
+                <a:latin typeface="Aptos" panose="020B0004020202020204" pitchFamily="34" charset="0"/>
+              </a:rPr>
+              <a:t>3.55%</a:t>
+            </a:r>
+            <a:endParaRPr lang="en-GB" sz="800" dirty="0">
+              <a:solidFill>
+                <a:srgbClr val="1E90FF"/>
+              </a:solidFill>
+              <a:latin typeface="Aptos" panose="020B0004020202020204" pitchFamily="34" charset="0"/>
+            </a:endParaRPr>
+          </a:p>
+        </p:txBody>
+      </p:sp>
+      <p:sp>
+        <p:nvSpPr>
+          <p:cNvPr id="49" name="TextBox 48">
+            <a:extLst>
+              <a:ext uri="{FF2B5EF4-FFF2-40B4-BE49-F238E27FC236}">
+                <a16:creationId xmlns:a16="http://schemas.microsoft.com/office/drawing/2014/main" id="{E31C0926-FCAD-84AE-58E0-61A04006E733}"/>
+              </a:ext>
+            </a:extLst>
+          </p:cNvPr>
+          <p:cNvSpPr txBox="1"/>
+          <p:nvPr/>
+        </p:nvSpPr>
+        <p:spPr>
+          <a:xfrm>
+            <a:off x="1195491" y="5455176"/>
+            <a:ext cx="461986" cy="215444"/>
+          </a:xfrm>
+          <a:prstGeom prst="rect">
+            <a:avLst/>
+          </a:prstGeom>
+          <a:noFill/>
+        </p:spPr>
+        <p:txBody>
+          <a:bodyPr wrap="none" rtlCol="0">
+            <a:spAutoFit/>
+          </a:bodyPr>
+          <a:lstStyle/>
+          <a:p>
+            <a:pPr algn="r"/>
+            <a:r>
+              <a:rPr lang="en-US" sz="800" dirty="0">
+                <a:solidFill>
+                  <a:srgbClr val="1E90FF"/>
+                </a:solidFill>
+                <a:latin typeface="Aptos" panose="020B0004020202020204" pitchFamily="34" charset="0"/>
+              </a:rPr>
+              <a:t>7.67%</a:t>
+            </a:r>
+            <a:endParaRPr lang="en-GB" sz="800" dirty="0">
+              <a:solidFill>
+                <a:srgbClr val="1E90FF"/>
+              </a:solidFill>
+              <a:latin typeface="Aptos" panose="020B0004020202020204" pitchFamily="34" charset="0"/>
+            </a:endParaRPr>
+          </a:p>
+        </p:txBody>
+      </p:sp>
+      <p:sp>
+        <p:nvSpPr>
+          <p:cNvPr id="50" name="TextBox 49">
+            <a:extLst>
+              <a:ext uri="{FF2B5EF4-FFF2-40B4-BE49-F238E27FC236}">
+                <a16:creationId xmlns:a16="http://schemas.microsoft.com/office/drawing/2014/main" id="{397E542B-DA69-5379-EF91-BD404A2D8B85}"/>
+              </a:ext>
+            </a:extLst>
+          </p:cNvPr>
+          <p:cNvSpPr txBox="1"/>
+          <p:nvPr/>
+        </p:nvSpPr>
+        <p:spPr>
+          <a:xfrm>
+            <a:off x="2397439" y="5092995"/>
+            <a:ext cx="461986" cy="215444"/>
+          </a:xfrm>
+          <a:prstGeom prst="rect">
+            <a:avLst/>
+          </a:prstGeom>
+          <a:noFill/>
+        </p:spPr>
+        <p:txBody>
+          <a:bodyPr wrap="none" rtlCol="0">
+            <a:spAutoFit/>
+          </a:bodyPr>
+          <a:lstStyle/>
+          <a:p>
+            <a:pPr algn="r"/>
+            <a:r>
+              <a:rPr lang="en-US" sz="800" dirty="0">
+                <a:solidFill>
+                  <a:srgbClr val="1E90FF"/>
+                </a:solidFill>
+                <a:latin typeface="Aptos" panose="020B0004020202020204" pitchFamily="34" charset="0"/>
+              </a:rPr>
+              <a:t>7.01%</a:t>
+            </a:r>
+            <a:endParaRPr lang="en-GB" sz="800" dirty="0">
+              <a:solidFill>
+                <a:srgbClr val="1E90FF"/>
+              </a:solidFill>
+              <a:latin typeface="Aptos" panose="020B0004020202020204" pitchFamily="34" charset="0"/>
+            </a:endParaRPr>
+          </a:p>
+        </p:txBody>
+      </p:sp>
+      <p:sp>
+        <p:nvSpPr>
+          <p:cNvPr id="51" name="TextBox 50">
+            <a:extLst>
+              <a:ext uri="{FF2B5EF4-FFF2-40B4-BE49-F238E27FC236}">
+                <a16:creationId xmlns:a16="http://schemas.microsoft.com/office/drawing/2014/main" id="{962F0B89-6E40-5A13-E7CD-2E866065F2EC}"/>
+              </a:ext>
+            </a:extLst>
+          </p:cNvPr>
+          <p:cNvSpPr txBox="1"/>
+          <p:nvPr/>
+        </p:nvSpPr>
+        <p:spPr>
+          <a:xfrm>
+            <a:off x="1867531" y="5540932"/>
+            <a:ext cx="516488" cy="215444"/>
+          </a:xfrm>
+          <a:prstGeom prst="rect">
+            <a:avLst/>
+          </a:prstGeom>
+          <a:noFill/>
+        </p:spPr>
+        <p:txBody>
+          <a:bodyPr wrap="none" rtlCol="0">
+            <a:spAutoFit/>
+          </a:bodyPr>
+          <a:lstStyle/>
+          <a:p>
+            <a:pPr algn="r"/>
+            <a:r>
+              <a:rPr lang="en-US" sz="800" dirty="0">
+                <a:solidFill>
+                  <a:srgbClr val="1E90FF"/>
+                </a:solidFill>
+                <a:latin typeface="Aptos" panose="020B0004020202020204" pitchFamily="34" charset="0"/>
+              </a:rPr>
+              <a:t>11.29%</a:t>
+            </a:r>
+            <a:endParaRPr lang="en-GB" sz="800" dirty="0">
+              <a:solidFill>
+                <a:srgbClr val="1E90FF"/>
               </a:solidFill>
               <a:latin typeface="Aptos" panose="020B0004020202020204" pitchFamily="34" charset="0"/>
             </a:endParaRPr>

</xml_diff>

<commit_message>
Added the corresponding percentile in the title
</commit_message>
<xml_diff>
--- a/Figures/09_OBS_NWP_Rainfall_10RP.pptx
+++ b/Figures/09_OBS_NWP_Rainfall_10RP.pptx
@@ -125,555 +125,12 @@
   <pc:docChgLst>
     <pc:chgData name="Fatima Pillosu" userId="a6295d4dc9e22643" providerId="LiveId" clId="{87453732-75AC-4426-B5D3-B7C69C2D4F54}"/>
     <pc:docChg chg="undo custSel addSld delSld modSld sldOrd">
-      <pc:chgData name="Fatima Pillosu" userId="a6295d4dc9e22643" providerId="LiveId" clId="{87453732-75AC-4426-B5D3-B7C69C2D4F54}" dt="2026-02-04T00:11:41.404" v="771" actId="1076"/>
+      <pc:chgData name="Fatima Pillosu" userId="a6295d4dc9e22643" providerId="LiveId" clId="{87453732-75AC-4426-B5D3-B7C69C2D4F54}" dt="2026-02-06T21:30:35.638" v="796" actId="20577"/>
       <pc:docMkLst>
         <pc:docMk/>
       </pc:docMkLst>
-      <pc:sldChg chg="addSp delSp modSp del mod ord">
-        <pc:chgData name="Fatima Pillosu" userId="a6295d4dc9e22643" providerId="LiveId" clId="{87453732-75AC-4426-B5D3-B7C69C2D4F54}" dt="2026-02-03T23:20:28.627" v="730" actId="2696"/>
-        <pc:sldMkLst>
-          <pc:docMk/>
-          <pc:sldMk cId="2533619745" sldId="256"/>
-        </pc:sldMkLst>
-        <pc:spChg chg="del">
-          <ac:chgData name="Fatima Pillosu" userId="a6295d4dc9e22643" providerId="LiveId" clId="{87453732-75AC-4426-B5D3-B7C69C2D4F54}" dt="2026-02-03T23:05:51.217" v="0" actId="21"/>
-          <ac:spMkLst>
-            <pc:docMk/>
-            <pc:sldMk cId="2533619745" sldId="256"/>
-            <ac:spMk id="12" creationId="{6520378A-35EE-1F85-E170-0464790BE8AC}"/>
-          </ac:spMkLst>
-        </pc:spChg>
-        <pc:spChg chg="del">
-          <ac:chgData name="Fatima Pillosu" userId="a6295d4dc9e22643" providerId="LiveId" clId="{87453732-75AC-4426-B5D3-B7C69C2D4F54}" dt="2026-02-03T23:05:51.217" v="0" actId="21"/>
-          <ac:spMkLst>
-            <pc:docMk/>
-            <pc:sldMk cId="2533619745" sldId="256"/>
-            <ac:spMk id="18" creationId="{EBDE5727-9AA8-E00B-F06F-7E468C6F8AA4}"/>
-          </ac:spMkLst>
-        </pc:spChg>
-        <pc:spChg chg="del">
-          <ac:chgData name="Fatima Pillosu" userId="a6295d4dc9e22643" providerId="LiveId" clId="{87453732-75AC-4426-B5D3-B7C69C2D4F54}" dt="2026-02-03T23:05:51.217" v="0" actId="21"/>
-          <ac:spMkLst>
-            <pc:docMk/>
-            <pc:sldMk cId="2533619745" sldId="256"/>
-            <ac:spMk id="19" creationId="{9DDC89D1-E5CE-5835-3875-246BC34AE9D5}"/>
-          </ac:spMkLst>
-        </pc:spChg>
-        <pc:spChg chg="del">
-          <ac:chgData name="Fatima Pillosu" userId="a6295d4dc9e22643" providerId="LiveId" clId="{87453732-75AC-4426-B5D3-B7C69C2D4F54}" dt="2026-02-03T23:05:51.217" v="0" actId="21"/>
-          <ac:spMkLst>
-            <pc:docMk/>
-            <pc:sldMk cId="2533619745" sldId="256"/>
-            <ac:spMk id="21" creationId="{F08482DF-8D44-ABD4-0D37-6E922270CBBA}"/>
-          </ac:spMkLst>
-        </pc:spChg>
-        <pc:spChg chg="del">
-          <ac:chgData name="Fatima Pillosu" userId="a6295d4dc9e22643" providerId="LiveId" clId="{87453732-75AC-4426-B5D3-B7C69C2D4F54}" dt="2026-02-03T23:05:51.217" v="0" actId="21"/>
-          <ac:spMkLst>
-            <pc:docMk/>
-            <pc:sldMk cId="2533619745" sldId="256"/>
-            <ac:spMk id="33" creationId="{2FCE7667-DE54-8BD6-089F-22699AA8A9C0}"/>
-          </ac:spMkLst>
-        </pc:spChg>
-        <pc:spChg chg="del">
-          <ac:chgData name="Fatima Pillosu" userId="a6295d4dc9e22643" providerId="LiveId" clId="{87453732-75AC-4426-B5D3-B7C69C2D4F54}" dt="2026-02-03T23:05:51.217" v="0" actId="21"/>
-          <ac:spMkLst>
-            <pc:docMk/>
-            <pc:sldMk cId="2533619745" sldId="256"/>
-            <ac:spMk id="46" creationId="{890795B9-A3C1-79D5-1DFB-AE8F1CED7638}"/>
-          </ac:spMkLst>
-        </pc:spChg>
-        <pc:spChg chg="del">
-          <ac:chgData name="Fatima Pillosu" userId="a6295d4dc9e22643" providerId="LiveId" clId="{87453732-75AC-4426-B5D3-B7C69C2D4F54}" dt="2026-02-03T23:05:51.217" v="0" actId="21"/>
-          <ac:spMkLst>
-            <pc:docMk/>
-            <pc:sldMk cId="2533619745" sldId="256"/>
-            <ac:spMk id="49" creationId="{C71CE387-5D5C-05EA-AA94-CF304EFC055C}"/>
-          </ac:spMkLst>
-        </pc:spChg>
-        <pc:spChg chg="del">
-          <ac:chgData name="Fatima Pillosu" userId="a6295d4dc9e22643" providerId="LiveId" clId="{87453732-75AC-4426-B5D3-B7C69C2D4F54}" dt="2026-02-03T23:05:51.217" v="0" actId="21"/>
-          <ac:spMkLst>
-            <pc:docMk/>
-            <pc:sldMk cId="2533619745" sldId="256"/>
-            <ac:spMk id="61" creationId="{08AB304C-23B9-5155-CAFD-DA4A72DA26A3}"/>
-          </ac:spMkLst>
-        </pc:spChg>
-        <pc:spChg chg="add mod">
-          <ac:chgData name="Fatima Pillosu" userId="a6295d4dc9e22643" providerId="LiveId" clId="{87453732-75AC-4426-B5D3-B7C69C2D4F54}" dt="2026-02-03T23:06:03.013" v="1"/>
-          <ac:spMkLst>
-            <pc:docMk/>
-            <pc:sldMk cId="2533619745" sldId="256"/>
-            <ac:spMk id="67" creationId="{C5FF35A0-2EF8-41ED-EB57-3A072DB38799}"/>
-          </ac:spMkLst>
-        </pc:spChg>
-        <pc:spChg chg="add mod">
-          <ac:chgData name="Fatima Pillosu" userId="a6295d4dc9e22643" providerId="LiveId" clId="{87453732-75AC-4426-B5D3-B7C69C2D4F54}" dt="2026-02-03T23:06:03.013" v="1"/>
-          <ac:spMkLst>
-            <pc:docMk/>
-            <pc:sldMk cId="2533619745" sldId="256"/>
-            <ac:spMk id="68" creationId="{913B77D8-CBA7-4EFA-2344-C36EAD8C11FD}"/>
-          </ac:spMkLst>
-        </pc:spChg>
-        <pc:spChg chg="mod">
-          <ac:chgData name="Fatima Pillosu" userId="a6295d4dc9e22643" providerId="LiveId" clId="{87453732-75AC-4426-B5D3-B7C69C2D4F54}" dt="2026-02-03T23:06:57.428" v="6" actId="207"/>
-          <ac:spMkLst>
-            <pc:docMk/>
-            <pc:sldMk cId="2533619745" sldId="256"/>
-            <ac:spMk id="71" creationId="{08B9FE87-B9BD-45A3-FB9C-2922CFAD6EFE}"/>
-          </ac:spMkLst>
-        </pc:spChg>
-        <pc:spChg chg="add mod">
-          <ac:chgData name="Fatima Pillosu" userId="a6295d4dc9e22643" providerId="LiveId" clId="{87453732-75AC-4426-B5D3-B7C69C2D4F54}" dt="2026-02-03T23:06:03.013" v="1"/>
-          <ac:spMkLst>
-            <pc:docMk/>
-            <pc:sldMk cId="2533619745" sldId="256"/>
-            <ac:spMk id="72" creationId="{53D7C8FF-34BC-8D2E-4F09-1179D1101F94}"/>
-          </ac:spMkLst>
-        </pc:spChg>
-        <pc:spChg chg="mod">
-          <ac:chgData name="Fatima Pillosu" userId="a6295d4dc9e22643" providerId="LiveId" clId="{87453732-75AC-4426-B5D3-B7C69C2D4F54}" dt="2026-02-03T23:06:57.428" v="6" actId="207"/>
-          <ac:spMkLst>
-            <pc:docMk/>
-            <pc:sldMk cId="2533619745" sldId="256"/>
-            <ac:spMk id="73" creationId="{948401C2-07EE-0B13-4FCA-5B5A5542C8D4}"/>
-          </ac:spMkLst>
-        </pc:spChg>
-        <pc:spChg chg="mod">
-          <ac:chgData name="Fatima Pillosu" userId="a6295d4dc9e22643" providerId="LiveId" clId="{87453732-75AC-4426-B5D3-B7C69C2D4F54}" dt="2026-02-03T23:06:57.428" v="6" actId="207"/>
-          <ac:spMkLst>
-            <pc:docMk/>
-            <pc:sldMk cId="2533619745" sldId="256"/>
-            <ac:spMk id="74" creationId="{1E41353E-77C2-FF76-58E5-3493F9D6B2EC}"/>
-          </ac:spMkLst>
-        </pc:spChg>
-        <pc:spChg chg="add mod">
-          <ac:chgData name="Fatima Pillosu" userId="a6295d4dc9e22643" providerId="LiveId" clId="{87453732-75AC-4426-B5D3-B7C69C2D4F54}" dt="2026-02-03T23:06:57.428" v="6" actId="207"/>
-          <ac:spMkLst>
-            <pc:docMk/>
-            <pc:sldMk cId="2533619745" sldId="256"/>
-            <ac:spMk id="77" creationId="{9DDC89D1-E5CE-5835-3875-246BC34AE9D5}"/>
-          </ac:spMkLst>
-        </pc:spChg>
-        <pc:spChg chg="add mod">
-          <ac:chgData name="Fatima Pillosu" userId="a6295d4dc9e22643" providerId="LiveId" clId="{87453732-75AC-4426-B5D3-B7C69C2D4F54}" dt="2026-02-03T23:06:03.013" v="1"/>
-          <ac:spMkLst>
-            <pc:docMk/>
-            <pc:sldMk cId="2533619745" sldId="256"/>
-            <ac:spMk id="81" creationId="{36361F96-D80E-9299-24FD-F17B459DB617}"/>
-          </ac:spMkLst>
-        </pc:spChg>
-        <pc:spChg chg="mod">
-          <ac:chgData name="Fatima Pillosu" userId="a6295d4dc9e22643" providerId="LiveId" clId="{87453732-75AC-4426-B5D3-B7C69C2D4F54}" dt="2026-02-03T23:06:57.428" v="6" actId="207"/>
-          <ac:spMkLst>
-            <pc:docMk/>
-            <pc:sldMk cId="2533619745" sldId="256"/>
-            <ac:spMk id="82" creationId="{2B1943C2-2045-07FD-7562-572B68EAC652}"/>
-          </ac:spMkLst>
-        </pc:spChg>
-        <pc:spChg chg="mod">
-          <ac:chgData name="Fatima Pillosu" userId="a6295d4dc9e22643" providerId="LiveId" clId="{87453732-75AC-4426-B5D3-B7C69C2D4F54}" dt="2026-02-03T23:06:38.600" v="4" actId="207"/>
-          <ac:spMkLst>
-            <pc:docMk/>
-            <pc:sldMk cId="2533619745" sldId="256"/>
-            <ac:spMk id="94" creationId="{09AB7203-434F-0A4C-76C6-8CC181FC46A1}"/>
-          </ac:spMkLst>
-        </pc:spChg>
-        <pc:spChg chg="del">
-          <ac:chgData name="Fatima Pillosu" userId="a6295d4dc9e22643" providerId="LiveId" clId="{87453732-75AC-4426-B5D3-B7C69C2D4F54}" dt="2026-02-03T23:05:51.217" v="0" actId="21"/>
-          <ac:spMkLst>
-            <pc:docMk/>
-            <pc:sldMk cId="2533619745" sldId="256"/>
-            <ac:spMk id="95" creationId="{67469E67-3DDE-0D4E-8C8F-BAED5FDE57A6}"/>
-          </ac:spMkLst>
-        </pc:spChg>
-        <pc:spChg chg="mod">
-          <ac:chgData name="Fatima Pillosu" userId="a6295d4dc9e22643" providerId="LiveId" clId="{87453732-75AC-4426-B5D3-B7C69C2D4F54}" dt="2026-02-03T23:06:38.600" v="4" actId="207"/>
-          <ac:spMkLst>
-            <pc:docMk/>
-            <pc:sldMk cId="2533619745" sldId="256"/>
-            <ac:spMk id="104" creationId="{09C85057-568F-6E68-4A25-62BBB2D00716}"/>
-          </ac:spMkLst>
-        </pc:spChg>
-        <pc:spChg chg="mod">
-          <ac:chgData name="Fatima Pillosu" userId="a6295d4dc9e22643" providerId="LiveId" clId="{87453732-75AC-4426-B5D3-B7C69C2D4F54}" dt="2026-02-03T23:06:38.600" v="4" actId="207"/>
-          <ac:spMkLst>
-            <pc:docMk/>
-            <pc:sldMk cId="2533619745" sldId="256"/>
-            <ac:spMk id="105" creationId="{D42F14AA-54BF-7F89-BA15-3413CF2266F0}"/>
-          </ac:spMkLst>
-        </pc:spChg>
-        <pc:spChg chg="add mod">
-          <ac:chgData name="Fatima Pillosu" userId="a6295d4dc9e22643" providerId="LiveId" clId="{87453732-75AC-4426-B5D3-B7C69C2D4F54}" dt="2026-02-03T23:06:38.600" v="4" actId="207"/>
-          <ac:spMkLst>
-            <pc:docMk/>
-            <pc:sldMk cId="2533619745" sldId="256"/>
-            <ac:spMk id="107" creationId="{96793A98-CE27-DC88-96F0-6C0E01A6D5F4}"/>
-          </ac:spMkLst>
-        </pc:spChg>
-        <pc:spChg chg="mod">
-          <ac:chgData name="Fatima Pillosu" userId="a6295d4dc9e22643" providerId="LiveId" clId="{87453732-75AC-4426-B5D3-B7C69C2D4F54}" dt="2026-02-03T23:06:38.600" v="4" actId="207"/>
-          <ac:spMkLst>
-            <pc:docMk/>
-            <pc:sldMk cId="2533619745" sldId="256"/>
-            <ac:spMk id="108" creationId="{15E81FFD-2622-67D6-8532-DDF600F4E3F7}"/>
-          </ac:spMkLst>
-        </pc:spChg>
-        <pc:spChg chg="del">
-          <ac:chgData name="Fatima Pillosu" userId="a6295d4dc9e22643" providerId="LiveId" clId="{87453732-75AC-4426-B5D3-B7C69C2D4F54}" dt="2026-02-03T23:05:51.217" v="0" actId="21"/>
-          <ac:spMkLst>
-            <pc:docMk/>
-            <pc:sldMk cId="2533619745" sldId="256"/>
-            <ac:spMk id="114" creationId="{F1FE3646-3BB8-AF3F-8CFA-62C26A536745}"/>
-          </ac:spMkLst>
-        </pc:spChg>
-        <pc:spChg chg="mod">
-          <ac:chgData name="Fatima Pillosu" userId="a6295d4dc9e22643" providerId="LiveId" clId="{87453732-75AC-4426-B5D3-B7C69C2D4F54}" dt="2026-02-03T23:06:38.600" v="4" actId="207"/>
-          <ac:spMkLst>
-            <pc:docMk/>
-            <pc:sldMk cId="2533619745" sldId="256"/>
-            <ac:spMk id="115" creationId="{2BE362A8-A849-A414-2538-4DE675188807}"/>
-          </ac:spMkLst>
-        </pc:spChg>
-        <pc:spChg chg="mod">
-          <ac:chgData name="Fatima Pillosu" userId="a6295d4dc9e22643" providerId="LiveId" clId="{87453732-75AC-4426-B5D3-B7C69C2D4F54}" dt="2026-02-03T23:06:38.600" v="4" actId="207"/>
-          <ac:spMkLst>
-            <pc:docMk/>
-            <pc:sldMk cId="2533619745" sldId="256"/>
-            <ac:spMk id="116" creationId="{6B89BB0B-96DA-67EC-0E28-BAB02F53455B}"/>
-          </ac:spMkLst>
-        </pc:spChg>
-        <pc:spChg chg="add mod">
-          <ac:chgData name="Fatima Pillosu" userId="a6295d4dc9e22643" providerId="LiveId" clId="{87453732-75AC-4426-B5D3-B7C69C2D4F54}" dt="2026-02-03T23:06:03.013" v="1"/>
-          <ac:spMkLst>
-            <pc:docMk/>
-            <pc:sldMk cId="2533619745" sldId="256"/>
-            <ac:spMk id="118" creationId="{E764D1E2-3FFE-CD53-26E4-9CB9ADDED3B9}"/>
-          </ac:spMkLst>
-        </pc:spChg>
-        <pc:spChg chg="mod">
-          <ac:chgData name="Fatima Pillosu" userId="a6295d4dc9e22643" providerId="LiveId" clId="{87453732-75AC-4426-B5D3-B7C69C2D4F54}" dt="2026-02-03T23:06:38.600" v="4" actId="207"/>
-          <ac:spMkLst>
-            <pc:docMk/>
-            <pc:sldMk cId="2533619745" sldId="256"/>
-            <ac:spMk id="119" creationId="{177EF369-F2F4-DB5B-E75B-8D4EAA0ACD79}"/>
-          </ac:spMkLst>
-        </pc:spChg>
-        <pc:spChg chg="mod">
-          <ac:chgData name="Fatima Pillosu" userId="a6295d4dc9e22643" providerId="LiveId" clId="{87453732-75AC-4426-B5D3-B7C69C2D4F54}" dt="2026-02-03T23:06:38.600" v="4" actId="207"/>
-          <ac:spMkLst>
-            <pc:docMk/>
-            <pc:sldMk cId="2533619745" sldId="256"/>
-            <ac:spMk id="120" creationId="{9BE57C0E-AF4B-DBB2-C2B3-B697200B98FC}"/>
-          </ac:spMkLst>
-        </pc:spChg>
-        <pc:spChg chg="mod">
-          <ac:chgData name="Fatima Pillosu" userId="a6295d4dc9e22643" providerId="LiveId" clId="{87453732-75AC-4426-B5D3-B7C69C2D4F54}" dt="2026-02-03T23:06:38.600" v="4" actId="207"/>
-          <ac:spMkLst>
-            <pc:docMk/>
-            <pc:sldMk cId="2533619745" sldId="256"/>
-            <ac:spMk id="123" creationId="{3B9D0D5A-F607-EA2E-354E-A13EB7795652}"/>
-          </ac:spMkLst>
-        </pc:spChg>
-        <pc:spChg chg="mod">
-          <ac:chgData name="Fatima Pillosu" userId="a6295d4dc9e22643" providerId="LiveId" clId="{87453732-75AC-4426-B5D3-B7C69C2D4F54}" dt="2026-02-03T23:06:51.031" v="5" actId="207"/>
-          <ac:spMkLst>
-            <pc:docMk/>
-            <pc:sldMk cId="2533619745" sldId="256"/>
-            <ac:spMk id="124" creationId="{BCAACC07-C9EB-0DBE-6A90-33D30CDDCBCD}"/>
-          </ac:spMkLst>
-        </pc:spChg>
-        <pc:spChg chg="mod">
-          <ac:chgData name="Fatima Pillosu" userId="a6295d4dc9e22643" providerId="LiveId" clId="{87453732-75AC-4426-B5D3-B7C69C2D4F54}" dt="2026-02-03T23:06:51.031" v="5" actId="207"/>
-          <ac:spMkLst>
-            <pc:docMk/>
-            <pc:sldMk cId="2533619745" sldId="256"/>
-            <ac:spMk id="125" creationId="{C71CE387-5D5C-05EA-AA94-CF304EFC055C}"/>
-          </ac:spMkLst>
-        </pc:spChg>
-        <pc:spChg chg="mod">
-          <ac:chgData name="Fatima Pillosu" userId="a6295d4dc9e22643" providerId="LiveId" clId="{87453732-75AC-4426-B5D3-B7C69C2D4F54}" dt="2026-02-03T23:06:51.031" v="5" actId="207"/>
-          <ac:spMkLst>
-            <pc:docMk/>
-            <pc:sldMk cId="2533619745" sldId="256"/>
-            <ac:spMk id="126" creationId="{16FF7CAC-A060-30D5-F1E3-E574E1DF2106}"/>
-          </ac:spMkLst>
-        </pc:spChg>
-        <pc:spChg chg="mod">
-          <ac:chgData name="Fatima Pillosu" userId="a6295d4dc9e22643" providerId="LiveId" clId="{87453732-75AC-4426-B5D3-B7C69C2D4F54}" dt="2026-02-03T23:06:51.031" v="5" actId="207"/>
-          <ac:spMkLst>
-            <pc:docMk/>
-            <pc:sldMk cId="2533619745" sldId="256"/>
-            <ac:spMk id="133" creationId="{10E6A214-E7D4-368E-5B2B-D33A8632F263}"/>
-          </ac:spMkLst>
-        </pc:spChg>
-        <pc:spChg chg="mod">
-          <ac:chgData name="Fatima Pillosu" userId="a6295d4dc9e22643" providerId="LiveId" clId="{87453732-75AC-4426-B5D3-B7C69C2D4F54}" dt="2026-02-03T23:06:51.031" v="5" actId="207"/>
-          <ac:spMkLst>
-            <pc:docMk/>
-            <pc:sldMk cId="2533619745" sldId="256"/>
-            <ac:spMk id="135" creationId="{C92284BC-80FE-3622-872B-96BC4DBA980A}"/>
-          </ac:spMkLst>
-        </pc:spChg>
-        <pc:spChg chg="mod">
-          <ac:chgData name="Fatima Pillosu" userId="a6295d4dc9e22643" providerId="LiveId" clId="{87453732-75AC-4426-B5D3-B7C69C2D4F54}" dt="2026-02-03T23:06:51.031" v="5" actId="207"/>
-          <ac:spMkLst>
-            <pc:docMk/>
-            <pc:sldMk cId="2533619745" sldId="256"/>
-            <ac:spMk id="137" creationId="{622D837A-FA0A-F568-7823-CECB43158FE9}"/>
-          </ac:spMkLst>
-        </pc:spChg>
-        <pc:spChg chg="mod">
-          <ac:chgData name="Fatima Pillosu" userId="a6295d4dc9e22643" providerId="LiveId" clId="{87453732-75AC-4426-B5D3-B7C69C2D4F54}" dt="2026-02-03T23:06:51.031" v="5" actId="207"/>
-          <ac:spMkLst>
-            <pc:docMk/>
-            <pc:sldMk cId="2533619745" sldId="256"/>
-            <ac:spMk id="139" creationId="{F2845272-3C53-11E9-9452-4DDB503F563F}"/>
-          </ac:spMkLst>
-        </pc:spChg>
-        <pc:spChg chg="mod">
-          <ac:chgData name="Fatima Pillosu" userId="a6295d4dc9e22643" providerId="LiveId" clId="{87453732-75AC-4426-B5D3-B7C69C2D4F54}" dt="2026-02-03T23:06:51.031" v="5" actId="207"/>
-          <ac:spMkLst>
-            <pc:docMk/>
-            <pc:sldMk cId="2533619745" sldId="256"/>
-            <ac:spMk id="141" creationId="{3F0296C9-929F-D396-DD9A-F6B5DF6D8714}"/>
-          </ac:spMkLst>
-        </pc:spChg>
-        <pc:spChg chg="mod">
-          <ac:chgData name="Fatima Pillosu" userId="a6295d4dc9e22643" providerId="LiveId" clId="{87453732-75AC-4426-B5D3-B7C69C2D4F54}" dt="2026-02-03T23:06:51.031" v="5" actId="207"/>
-          <ac:spMkLst>
-            <pc:docMk/>
-            <pc:sldMk cId="2533619745" sldId="256"/>
-            <ac:spMk id="143" creationId="{1378CB39-D256-8CFF-4299-C21A86B72F42}"/>
-          </ac:spMkLst>
-        </pc:spChg>
-        <pc:spChg chg="mod">
-          <ac:chgData name="Fatima Pillosu" userId="a6295d4dc9e22643" providerId="LiveId" clId="{87453732-75AC-4426-B5D3-B7C69C2D4F54}" dt="2026-02-03T23:06:51.031" v="5" actId="207"/>
-          <ac:spMkLst>
-            <pc:docMk/>
-            <pc:sldMk cId="2533619745" sldId="256"/>
-            <ac:spMk id="145" creationId="{3EF33862-88A6-9117-F819-9A60CFA97778}"/>
-          </ac:spMkLst>
-        </pc:spChg>
-        <pc:spChg chg="mod">
-          <ac:chgData name="Fatima Pillosu" userId="a6295d4dc9e22643" providerId="LiveId" clId="{87453732-75AC-4426-B5D3-B7C69C2D4F54}" dt="2026-02-03T23:06:29.303" v="3" actId="207"/>
-          <ac:spMkLst>
-            <pc:docMk/>
-            <pc:sldMk cId="2533619745" sldId="256"/>
-            <ac:spMk id="149" creationId="{AFB46E55-1526-3859-3CED-42B7B7F23E47}"/>
-          </ac:spMkLst>
-        </pc:spChg>
-        <pc:spChg chg="mod">
-          <ac:chgData name="Fatima Pillosu" userId="a6295d4dc9e22643" providerId="LiveId" clId="{87453732-75AC-4426-B5D3-B7C69C2D4F54}" dt="2026-02-03T23:06:29.303" v="3" actId="207"/>
-          <ac:spMkLst>
-            <pc:docMk/>
-            <pc:sldMk cId="2533619745" sldId="256"/>
-            <ac:spMk id="151" creationId="{76AA2C80-910A-7064-1527-569D6A3C31FA}"/>
-          </ac:spMkLst>
-        </pc:spChg>
-        <pc:spChg chg="mod">
-          <ac:chgData name="Fatima Pillosu" userId="a6295d4dc9e22643" providerId="LiveId" clId="{87453732-75AC-4426-B5D3-B7C69C2D4F54}" dt="2026-02-03T23:06:29.303" v="3" actId="207"/>
-          <ac:spMkLst>
-            <pc:docMk/>
-            <pc:sldMk cId="2533619745" sldId="256"/>
-            <ac:spMk id="153" creationId="{08AB304C-23B9-5155-CAFD-DA4A72DA26A3}"/>
-          </ac:spMkLst>
-        </pc:spChg>
-        <pc:spChg chg="mod">
-          <ac:chgData name="Fatima Pillosu" userId="a6295d4dc9e22643" providerId="LiveId" clId="{87453732-75AC-4426-B5D3-B7C69C2D4F54}" dt="2026-02-03T23:06:29.303" v="3" actId="207"/>
-          <ac:spMkLst>
-            <pc:docMk/>
-            <pc:sldMk cId="2533619745" sldId="256"/>
-            <ac:spMk id="155" creationId="{FFF21F9F-5652-AF49-3E22-B3FD33D26D42}"/>
-          </ac:spMkLst>
-        </pc:spChg>
-        <pc:spChg chg="mod">
-          <ac:chgData name="Fatima Pillosu" userId="a6295d4dc9e22643" providerId="LiveId" clId="{87453732-75AC-4426-B5D3-B7C69C2D4F54}" dt="2026-02-03T23:06:29.303" v="3" actId="207"/>
-          <ac:spMkLst>
-            <pc:docMk/>
-            <pc:sldMk cId="2533619745" sldId="256"/>
-            <ac:spMk id="157" creationId="{8DB6CC17-5ED4-E15E-242C-90527923EE66}"/>
-          </ac:spMkLst>
-        </pc:spChg>
-        <pc:spChg chg="mod">
-          <ac:chgData name="Fatima Pillosu" userId="a6295d4dc9e22643" providerId="LiveId" clId="{87453732-75AC-4426-B5D3-B7C69C2D4F54}" dt="2026-02-03T23:07:12.385" v="7" actId="207"/>
-          <ac:spMkLst>
-            <pc:docMk/>
-            <pc:sldMk cId="2533619745" sldId="256"/>
-            <ac:spMk id="159" creationId="{4A9150D6-3674-1E6C-8B64-4C88385A34BF}"/>
-          </ac:spMkLst>
-        </pc:spChg>
-        <pc:spChg chg="mod">
-          <ac:chgData name="Fatima Pillosu" userId="a6295d4dc9e22643" providerId="LiveId" clId="{87453732-75AC-4426-B5D3-B7C69C2D4F54}" dt="2026-02-03T23:07:12.385" v="7" actId="207"/>
-          <ac:spMkLst>
-            <pc:docMk/>
-            <pc:sldMk cId="2533619745" sldId="256"/>
-            <ac:spMk id="161" creationId="{83088C1F-EDEB-16DF-3676-98AB4ED4BF89}"/>
-          </ac:spMkLst>
-        </pc:spChg>
-        <pc:spChg chg="mod">
-          <ac:chgData name="Fatima Pillosu" userId="a6295d4dc9e22643" providerId="LiveId" clId="{87453732-75AC-4426-B5D3-B7C69C2D4F54}" dt="2026-02-03T23:07:12.385" v="7" actId="207"/>
-          <ac:spMkLst>
-            <pc:docMk/>
-            <pc:sldMk cId="2533619745" sldId="256"/>
-            <ac:spMk id="163" creationId="{0E09DF20-EF6C-D1CC-2AA5-549C76038B16}"/>
-          </ac:spMkLst>
-        </pc:spChg>
-        <pc:spChg chg="mod">
-          <ac:chgData name="Fatima Pillosu" userId="a6295d4dc9e22643" providerId="LiveId" clId="{87453732-75AC-4426-B5D3-B7C69C2D4F54}" dt="2026-02-03T23:07:12.385" v="7" actId="207"/>
-          <ac:spMkLst>
-            <pc:docMk/>
-            <pc:sldMk cId="2533619745" sldId="256"/>
-            <ac:spMk id="165" creationId="{9F63337D-15FC-B2DA-CD4D-14FC02A16106}"/>
-          </ac:spMkLst>
-        </pc:spChg>
-        <pc:spChg chg="add mod">
-          <ac:chgData name="Fatima Pillosu" userId="a6295d4dc9e22643" providerId="LiveId" clId="{87453732-75AC-4426-B5D3-B7C69C2D4F54}" dt="2026-02-03T23:07:12.385" v="7" actId="207"/>
-          <ac:spMkLst>
-            <pc:docMk/>
-            <pc:sldMk cId="2533619745" sldId="256"/>
-            <ac:spMk id="167" creationId="{94E5C091-A7DF-B2EF-2028-BD889CEEAE21}"/>
-          </ac:spMkLst>
-        </pc:spChg>
-        <pc:spChg chg="mod">
-          <ac:chgData name="Fatima Pillosu" userId="a6295d4dc9e22643" providerId="LiveId" clId="{87453732-75AC-4426-B5D3-B7C69C2D4F54}" dt="2026-02-03T23:07:12.385" v="7" actId="207"/>
-          <ac:spMkLst>
-            <pc:docMk/>
-            <pc:sldMk cId="2533619745" sldId="256"/>
-            <ac:spMk id="169" creationId="{451DF8E4-E60F-7E32-181A-12A3E2827D81}"/>
-          </ac:spMkLst>
-        </pc:spChg>
-        <pc:spChg chg="mod">
-          <ac:chgData name="Fatima Pillosu" userId="a6295d4dc9e22643" providerId="LiveId" clId="{87453732-75AC-4426-B5D3-B7C69C2D4F54}" dt="2026-02-03T23:07:12.385" v="7" actId="207"/>
-          <ac:spMkLst>
-            <pc:docMk/>
-            <pc:sldMk cId="2533619745" sldId="256"/>
-            <ac:spMk id="171" creationId="{67469E67-3DDE-0D4E-8C8F-BAED5FDE57A6}"/>
-          </ac:spMkLst>
-        </pc:spChg>
-        <pc:spChg chg="mod">
-          <ac:chgData name="Fatima Pillosu" userId="a6295d4dc9e22643" providerId="LiveId" clId="{87453732-75AC-4426-B5D3-B7C69C2D4F54}" dt="2026-02-03T23:07:12.385" v="7" actId="207"/>
-          <ac:spMkLst>
-            <pc:docMk/>
-            <pc:sldMk cId="2533619745" sldId="256"/>
-            <ac:spMk id="173" creationId="{02064EC6-B2C9-5E5C-AAB6-25307A5756FC}"/>
-          </ac:spMkLst>
-        </pc:spChg>
-        <pc:spChg chg="mod">
-          <ac:chgData name="Fatima Pillosu" userId="a6295d4dc9e22643" providerId="LiveId" clId="{87453732-75AC-4426-B5D3-B7C69C2D4F54}" dt="2026-02-03T23:07:12.385" v="7" actId="207"/>
-          <ac:spMkLst>
-            <pc:docMk/>
-            <pc:sldMk cId="2533619745" sldId="256"/>
-            <ac:spMk id="175" creationId="{BAE3EA97-150F-0328-C9BC-2C66499C7444}"/>
-          </ac:spMkLst>
-        </pc:spChg>
-        <pc:spChg chg="mod">
-          <ac:chgData name="Fatima Pillosu" userId="a6295d4dc9e22643" providerId="LiveId" clId="{87453732-75AC-4426-B5D3-B7C69C2D4F54}" dt="2026-02-03T23:07:12.385" v="7" actId="207"/>
-          <ac:spMkLst>
-            <pc:docMk/>
-            <pc:sldMk cId="2533619745" sldId="256"/>
-            <ac:spMk id="177" creationId="{49CD84FD-B273-B786-D2F5-F4EFEEC85379}"/>
-          </ac:spMkLst>
-        </pc:spChg>
-        <pc:spChg chg="add mod">
-          <ac:chgData name="Fatima Pillosu" userId="a6295d4dc9e22643" providerId="LiveId" clId="{87453732-75AC-4426-B5D3-B7C69C2D4F54}" dt="2026-02-03T23:06:03.013" v="1"/>
-          <ac:spMkLst>
-            <pc:docMk/>
-            <pc:sldMk cId="2533619745" sldId="256"/>
-            <ac:spMk id="179" creationId="{F8CD1F6D-BC3B-1236-E103-16ED36410D09}"/>
-          </ac:spMkLst>
-        </pc:spChg>
-        <pc:spChg chg="mod">
-          <ac:chgData name="Fatima Pillosu" userId="a6295d4dc9e22643" providerId="LiveId" clId="{87453732-75AC-4426-B5D3-B7C69C2D4F54}" dt="2026-02-03T23:07:29.995" v="8" actId="207"/>
-          <ac:spMkLst>
-            <pc:docMk/>
-            <pc:sldMk cId="2533619745" sldId="256"/>
-            <ac:spMk id="181" creationId="{09F58019-2D82-1FD0-FFFF-AC5D8E825BC4}"/>
-          </ac:spMkLst>
-        </pc:spChg>
-        <pc:spChg chg="mod">
-          <ac:chgData name="Fatima Pillosu" userId="a6295d4dc9e22643" providerId="LiveId" clId="{87453732-75AC-4426-B5D3-B7C69C2D4F54}" dt="2026-02-03T23:07:29.995" v="8" actId="207"/>
-          <ac:spMkLst>
-            <pc:docMk/>
-            <pc:sldMk cId="2533619745" sldId="256"/>
-            <ac:spMk id="183" creationId="{ACB7247A-23D8-8F0A-9FC5-04356421700D}"/>
-          </ac:spMkLst>
-        </pc:spChg>
-        <pc:spChg chg="mod">
-          <ac:chgData name="Fatima Pillosu" userId="a6295d4dc9e22643" providerId="LiveId" clId="{87453732-75AC-4426-B5D3-B7C69C2D4F54}" dt="2026-02-03T23:07:29.995" v="8" actId="207"/>
-          <ac:spMkLst>
-            <pc:docMk/>
-            <pc:sldMk cId="2533619745" sldId="256"/>
-            <ac:spMk id="185" creationId="{08D42543-07CF-EE88-5469-71D197C1E951}"/>
-          </ac:spMkLst>
-        </pc:spChg>
-        <pc:spChg chg="mod">
-          <ac:chgData name="Fatima Pillosu" userId="a6295d4dc9e22643" providerId="LiveId" clId="{87453732-75AC-4426-B5D3-B7C69C2D4F54}" dt="2026-02-03T23:07:29.995" v="8" actId="207"/>
-          <ac:spMkLst>
-            <pc:docMk/>
-            <pc:sldMk cId="2533619745" sldId="256"/>
-            <ac:spMk id="186" creationId="{B27F131E-7731-424D-8DC3-078560AA216C}"/>
-          </ac:spMkLst>
-        </pc:spChg>
-        <pc:spChg chg="mod">
-          <ac:chgData name="Fatima Pillosu" userId="a6295d4dc9e22643" providerId="LiveId" clId="{87453732-75AC-4426-B5D3-B7C69C2D4F54}" dt="2026-02-03T23:07:29.995" v="8" actId="207"/>
-          <ac:spMkLst>
-            <pc:docMk/>
-            <pc:sldMk cId="2533619745" sldId="256"/>
-            <ac:spMk id="187" creationId="{9EA7E721-5BC3-2153-0E80-A911570F1205}"/>
-          </ac:spMkLst>
-        </pc:spChg>
-        <pc:spChg chg="add mod">
-          <ac:chgData name="Fatima Pillosu" userId="a6295d4dc9e22643" providerId="LiveId" clId="{87453732-75AC-4426-B5D3-B7C69C2D4F54}" dt="2026-02-03T23:06:57.428" v="6" actId="207"/>
-          <ac:spMkLst>
-            <pc:docMk/>
-            <pc:sldMk cId="2533619745" sldId="256"/>
-            <ac:spMk id="188" creationId="{F1FE3646-3BB8-AF3F-8CFA-62C26A536745}"/>
-          </ac:spMkLst>
-        </pc:spChg>
-        <pc:spChg chg="mod">
-          <ac:chgData name="Fatima Pillosu" userId="a6295d4dc9e22643" providerId="LiveId" clId="{87453732-75AC-4426-B5D3-B7C69C2D4F54}" dt="2026-02-03T23:07:29.995" v="8" actId="207"/>
-          <ac:spMkLst>
-            <pc:docMk/>
-            <pc:sldMk cId="2533619745" sldId="256"/>
-            <ac:spMk id="189" creationId="{914C9C00-502C-3C29-A9FC-5317085FF16A}"/>
-          </ac:spMkLst>
-        </pc:spChg>
-        <pc:spChg chg="mod">
-          <ac:chgData name="Fatima Pillosu" userId="a6295d4dc9e22643" providerId="LiveId" clId="{87453732-75AC-4426-B5D3-B7C69C2D4F54}" dt="2026-02-03T23:07:29.995" v="8" actId="207"/>
-          <ac:spMkLst>
-            <pc:docMk/>
-            <pc:sldMk cId="2533619745" sldId="256"/>
-            <ac:spMk id="190" creationId="{423CA979-60AC-3BE4-3B28-E108DE07ADBC}"/>
-          </ac:spMkLst>
-        </pc:spChg>
-        <pc:spChg chg="mod">
-          <ac:chgData name="Fatima Pillosu" userId="a6295d4dc9e22643" providerId="LiveId" clId="{87453732-75AC-4426-B5D3-B7C69C2D4F54}" dt="2026-02-03T23:07:29.995" v="8" actId="207"/>
-          <ac:spMkLst>
-            <pc:docMk/>
-            <pc:sldMk cId="2533619745" sldId="256"/>
-            <ac:spMk id="192" creationId="{D07A1B98-A306-3C21-02E4-5EAD9114393D}"/>
-          </ac:spMkLst>
-        </pc:spChg>
-        <pc:spChg chg="mod">
-          <ac:chgData name="Fatima Pillosu" userId="a6295d4dc9e22643" providerId="LiveId" clId="{87453732-75AC-4426-B5D3-B7C69C2D4F54}" dt="2026-02-03T23:07:29.995" v="8" actId="207"/>
-          <ac:spMkLst>
-            <pc:docMk/>
-            <pc:sldMk cId="2533619745" sldId="256"/>
-            <ac:spMk id="193" creationId="{26F8465A-EBD6-3514-0979-891B9C58DA15}"/>
-          </ac:spMkLst>
-        </pc:spChg>
-        <pc:spChg chg="mod">
-          <ac:chgData name="Fatima Pillosu" userId="a6295d4dc9e22643" providerId="LiveId" clId="{87453732-75AC-4426-B5D3-B7C69C2D4F54}" dt="2026-02-03T23:07:29.995" v="8" actId="207"/>
-          <ac:spMkLst>
-            <pc:docMk/>
-            <pc:sldMk cId="2533619745" sldId="256"/>
-            <ac:spMk id="194" creationId="{751A407A-AB2A-7696-0FDD-18318483B6A6}"/>
-          </ac:spMkLst>
-        </pc:spChg>
-      </pc:sldChg>
       <pc:sldChg chg="addSp delSp modSp add mod">
-        <pc:chgData name="Fatima Pillosu" userId="a6295d4dc9e22643" providerId="LiveId" clId="{87453732-75AC-4426-B5D3-B7C69C2D4F54}" dt="2026-02-04T00:11:41.404" v="771" actId="1076"/>
+        <pc:chgData name="Fatima Pillosu" userId="a6295d4dc9e22643" providerId="LiveId" clId="{87453732-75AC-4426-B5D3-B7C69C2D4F54}" dt="2026-02-06T21:30:35.638" v="796" actId="20577"/>
         <pc:sldMkLst>
           <pc:docMk/>
           <pc:sldMk cId="3613734767" sldId="257"/>
@@ -1038,46 +495,6 @@
             <ac:spMk id="51" creationId="{962F0B89-6E40-5A13-E7CD-2E866065F2EC}"/>
           </ac:spMkLst>
         </pc:spChg>
-        <pc:spChg chg="del">
-          <ac:chgData name="Fatima Pillosu" userId="a6295d4dc9e22643" providerId="LiveId" clId="{87453732-75AC-4426-B5D3-B7C69C2D4F54}" dt="2026-02-03T23:10:31.667" v="259" actId="478"/>
-          <ac:spMkLst>
-            <pc:docMk/>
-            <pc:sldMk cId="3613734767" sldId="257"/>
-            <ac:spMk id="66" creationId="{B8091FF4-DF2E-3CC4-D30A-87AEF59E4948}"/>
-          </ac:spMkLst>
-        </pc:spChg>
-        <pc:spChg chg="del">
-          <ac:chgData name="Fatima Pillosu" userId="a6295d4dc9e22643" providerId="LiveId" clId="{87453732-75AC-4426-B5D3-B7C69C2D4F54}" dt="2026-02-03T23:10:31.667" v="259" actId="478"/>
-          <ac:spMkLst>
-            <pc:docMk/>
-            <pc:sldMk cId="3613734767" sldId="257"/>
-            <ac:spMk id="67" creationId="{BA0480EB-3466-9824-C6DA-97606CFB80A8}"/>
-          </ac:spMkLst>
-        </pc:spChg>
-        <pc:spChg chg="del">
-          <ac:chgData name="Fatima Pillosu" userId="a6295d4dc9e22643" providerId="LiveId" clId="{87453732-75AC-4426-B5D3-B7C69C2D4F54}" dt="2026-02-03T23:10:31.667" v="259" actId="478"/>
-          <ac:spMkLst>
-            <pc:docMk/>
-            <pc:sldMk cId="3613734767" sldId="257"/>
-            <ac:spMk id="76" creationId="{60D793E3-8DB6-6541-CE69-6DF8A856A1E6}"/>
-          </ac:spMkLst>
-        </pc:spChg>
-        <pc:spChg chg="del">
-          <ac:chgData name="Fatima Pillosu" userId="a6295d4dc9e22643" providerId="LiveId" clId="{87453732-75AC-4426-B5D3-B7C69C2D4F54}" dt="2026-02-03T23:10:31.667" v="259" actId="478"/>
-          <ac:spMkLst>
-            <pc:docMk/>
-            <pc:sldMk cId="3613734767" sldId="257"/>
-            <ac:spMk id="78" creationId="{BBA67334-2CE1-22CA-A10F-5C96BA618AA7}"/>
-          </ac:spMkLst>
-        </pc:spChg>
-        <pc:spChg chg="del">
-          <ac:chgData name="Fatima Pillosu" userId="a6295d4dc9e22643" providerId="LiveId" clId="{87453732-75AC-4426-B5D3-B7C69C2D4F54}" dt="2026-02-03T23:10:31.667" v="259" actId="478"/>
-          <ac:spMkLst>
-            <pc:docMk/>
-            <pc:sldMk cId="3613734767" sldId="257"/>
-            <ac:spMk id="89" creationId="{1C9B51CC-135A-F587-7B21-65CF92538DBA}"/>
-          </ac:spMkLst>
-        </pc:spChg>
         <pc:spChg chg="mod">
           <ac:chgData name="Fatima Pillosu" userId="a6295d4dc9e22643" providerId="LiveId" clId="{87453732-75AC-4426-B5D3-B7C69C2D4F54}" dt="2026-02-03T23:08:16.539" v="11" actId="164"/>
           <ac:spMkLst>
@@ -1247,7 +664,7 @@
           </ac:spMkLst>
         </pc:spChg>
         <pc:spChg chg="mod">
-          <ac:chgData name="Fatima Pillosu" userId="a6295d4dc9e22643" providerId="LiveId" clId="{87453732-75AC-4426-B5D3-B7C69C2D4F54}" dt="2026-02-03T23:17:51.378" v="513" actId="207"/>
+          <ac:chgData name="Fatima Pillosu" userId="a6295d4dc9e22643" providerId="LiveId" clId="{87453732-75AC-4426-B5D3-B7C69C2D4F54}" dt="2026-02-06T21:30:35.638" v="796" actId="20577"/>
           <ac:spMkLst>
             <pc:docMk/>
             <pc:sldMk cId="3613734767" sldId="257"/>
@@ -1278,46 +695,6 @@
             <ac:spMk id="153" creationId="{9B215549-0099-BCE4-4289-61EDD74383B3}"/>
           </ac:spMkLst>
         </pc:spChg>
-        <pc:spChg chg="del">
-          <ac:chgData name="Fatima Pillosu" userId="a6295d4dc9e22643" providerId="LiveId" clId="{87453732-75AC-4426-B5D3-B7C69C2D4F54}" dt="2026-02-03T23:10:31.667" v="259" actId="478"/>
-          <ac:spMkLst>
-            <pc:docMk/>
-            <pc:sldMk cId="3613734767" sldId="257"/>
-            <ac:spMk id="167" creationId="{67B1AD13-DD91-CCC8-E730-50754E52A1B3}"/>
-          </ac:spMkLst>
-        </pc:spChg>
-        <pc:spChg chg="del">
-          <ac:chgData name="Fatima Pillosu" userId="a6295d4dc9e22643" providerId="LiveId" clId="{87453732-75AC-4426-B5D3-B7C69C2D4F54}" dt="2026-02-03T23:10:31.667" v="259" actId="478"/>
-          <ac:spMkLst>
-            <pc:docMk/>
-            <pc:sldMk cId="3613734767" sldId="257"/>
-            <ac:spMk id="175" creationId="{801B827C-D89D-8447-9111-B9618EAFA573}"/>
-          </ac:spMkLst>
-        </pc:spChg>
-        <pc:spChg chg="del">
-          <ac:chgData name="Fatima Pillosu" userId="a6295d4dc9e22643" providerId="LiveId" clId="{87453732-75AC-4426-B5D3-B7C69C2D4F54}" dt="2026-02-03T23:10:31.667" v="259" actId="478"/>
-          <ac:spMkLst>
-            <pc:docMk/>
-            <pc:sldMk cId="3613734767" sldId="257"/>
-            <ac:spMk id="183" creationId="{60FCFF27-2959-2DC5-AF74-FFE34C2E9BD7}"/>
-          </ac:spMkLst>
-        </pc:spChg>
-        <pc:spChg chg="del">
-          <ac:chgData name="Fatima Pillosu" userId="a6295d4dc9e22643" providerId="LiveId" clId="{87453732-75AC-4426-B5D3-B7C69C2D4F54}" dt="2026-02-03T23:10:31.667" v="259" actId="478"/>
-          <ac:spMkLst>
-            <pc:docMk/>
-            <pc:sldMk cId="3613734767" sldId="257"/>
-            <ac:spMk id="186" creationId="{E7387E71-7072-BD78-97FD-EC01FAD47439}"/>
-          </ac:spMkLst>
-        </pc:spChg>
-        <pc:spChg chg="del">
-          <ac:chgData name="Fatima Pillosu" userId="a6295d4dc9e22643" providerId="LiveId" clId="{87453732-75AC-4426-B5D3-B7C69C2D4F54}" dt="2026-02-03T23:10:31.667" v="259" actId="478"/>
-          <ac:spMkLst>
-            <pc:docMk/>
-            <pc:sldMk cId="3613734767" sldId="257"/>
-            <ac:spMk id="187" creationId="{CF07BCBB-3FFA-4EAD-E6D1-6B7400D4B6B5}"/>
-          </ac:spMkLst>
-        </pc:spChg>
         <pc:grpChg chg="mod">
           <ac:chgData name="Fatima Pillosu" userId="a6295d4dc9e22643" providerId="LiveId" clId="{87453732-75AC-4426-B5D3-B7C69C2D4F54}" dt="2026-02-03T23:13:48.875" v="372" actId="1076"/>
           <ac:grpSpMkLst>
@@ -1340,14 +717,6 @@
             <pc:docMk/>
             <pc:sldMk cId="3613734767" sldId="257"/>
             <ac:picMk id="4" creationId="{C6A13427-C4BA-DCEF-EAAA-4D063B50F8B4}"/>
-          </ac:picMkLst>
-        </pc:picChg>
-        <pc:picChg chg="add del mod">
-          <ac:chgData name="Fatima Pillosu" userId="a6295d4dc9e22643" providerId="LiveId" clId="{87453732-75AC-4426-B5D3-B7C69C2D4F54}" dt="2026-02-04T00:07:58.378" v="731" actId="478"/>
-          <ac:picMkLst>
-            <pc:docMk/>
-            <pc:sldMk cId="3613734767" sldId="257"/>
-            <ac:picMk id="8" creationId="{8EA258E9-3AE0-B8D7-2611-9967ADB40271}"/>
           </ac:picMkLst>
         </pc:picChg>
         <pc:picChg chg="mod">
@@ -1495,7 +864,7 @@
           <a:p>
             <a:fld id="{0D1B1566-5782-41C1-BF25-CC47B8AC8D46}" type="datetimeFigureOut">
               <a:rPr lang="en-GB" smtClean="0"/>
-              <a:t>04/02/2026</a:t>
+              <a:t>06/02/2026</a:t>
             </a:fld>
             <a:endParaRPr lang="en-GB"/>
           </a:p>
@@ -1665,7 +1034,7 @@
           <a:p>
             <a:fld id="{0D1B1566-5782-41C1-BF25-CC47B8AC8D46}" type="datetimeFigureOut">
               <a:rPr lang="en-GB" smtClean="0"/>
-              <a:t>04/02/2026</a:t>
+              <a:t>06/02/2026</a:t>
             </a:fld>
             <a:endParaRPr lang="en-GB"/>
           </a:p>
@@ -1845,7 +1214,7 @@
           <a:p>
             <a:fld id="{0D1B1566-5782-41C1-BF25-CC47B8AC8D46}" type="datetimeFigureOut">
               <a:rPr lang="en-GB" smtClean="0"/>
-              <a:t>04/02/2026</a:t>
+              <a:t>06/02/2026</a:t>
             </a:fld>
             <a:endParaRPr lang="en-GB"/>
           </a:p>
@@ -2015,7 +1384,7 @@
           <a:p>
             <a:fld id="{0D1B1566-5782-41C1-BF25-CC47B8AC8D46}" type="datetimeFigureOut">
               <a:rPr lang="en-GB" smtClean="0"/>
-              <a:t>04/02/2026</a:t>
+              <a:t>06/02/2026</a:t>
             </a:fld>
             <a:endParaRPr lang="en-GB"/>
           </a:p>
@@ -2259,7 +1628,7 @@
           <a:p>
             <a:fld id="{0D1B1566-5782-41C1-BF25-CC47B8AC8D46}" type="datetimeFigureOut">
               <a:rPr lang="en-GB" smtClean="0"/>
-              <a:t>04/02/2026</a:t>
+              <a:t>06/02/2026</a:t>
             </a:fld>
             <a:endParaRPr lang="en-GB"/>
           </a:p>
@@ -2491,7 +1860,7 @@
           <a:p>
             <a:fld id="{0D1B1566-5782-41C1-BF25-CC47B8AC8D46}" type="datetimeFigureOut">
               <a:rPr lang="en-GB" smtClean="0"/>
-              <a:t>04/02/2026</a:t>
+              <a:t>06/02/2026</a:t>
             </a:fld>
             <a:endParaRPr lang="en-GB"/>
           </a:p>
@@ -2858,7 +2227,7 @@
           <a:p>
             <a:fld id="{0D1B1566-5782-41C1-BF25-CC47B8AC8D46}" type="datetimeFigureOut">
               <a:rPr lang="en-GB" smtClean="0"/>
-              <a:t>04/02/2026</a:t>
+              <a:t>06/02/2026</a:t>
             </a:fld>
             <a:endParaRPr lang="en-GB"/>
           </a:p>
@@ -2976,7 +2345,7 @@
           <a:p>
             <a:fld id="{0D1B1566-5782-41C1-BF25-CC47B8AC8D46}" type="datetimeFigureOut">
               <a:rPr lang="en-GB" smtClean="0"/>
-              <a:t>04/02/2026</a:t>
+              <a:t>06/02/2026</a:t>
             </a:fld>
             <a:endParaRPr lang="en-GB"/>
           </a:p>
@@ -3071,7 +2440,7 @@
           <a:p>
             <a:fld id="{0D1B1566-5782-41C1-BF25-CC47B8AC8D46}" type="datetimeFigureOut">
               <a:rPr lang="en-GB" smtClean="0"/>
-              <a:t>04/02/2026</a:t>
+              <a:t>06/02/2026</a:t>
             </a:fld>
             <a:endParaRPr lang="en-GB"/>
           </a:p>
@@ -3348,7 +2717,7 @@
           <a:p>
             <a:fld id="{0D1B1566-5782-41C1-BF25-CC47B8AC8D46}" type="datetimeFigureOut">
               <a:rPr lang="en-GB" smtClean="0"/>
-              <a:t>04/02/2026</a:t>
+              <a:t>06/02/2026</a:t>
             </a:fld>
             <a:endParaRPr lang="en-GB"/>
           </a:p>
@@ -3605,7 +2974,7 @@
           <a:p>
             <a:fld id="{0D1B1566-5782-41C1-BF25-CC47B8AC8D46}" type="datetimeFigureOut">
               <a:rPr lang="en-GB" smtClean="0"/>
-              <a:t>04/02/2026</a:t>
+              <a:t>06/02/2026</a:t>
             </a:fld>
             <a:endParaRPr lang="en-GB"/>
           </a:p>
@@ -3818,7 +3187,7 @@
           <a:p>
             <a:fld id="{0D1B1566-5782-41C1-BF25-CC47B8AC8D46}" type="datetimeFigureOut">
               <a:rPr lang="en-GB" smtClean="0"/>
-              <a:t>04/02/2026</a:t>
+              <a:t>06/02/2026</a:t>
             </a:fld>
             <a:endParaRPr lang="en-GB"/>
           </a:p>
@@ -6081,7 +5450,31 @@
                 </a:solidFill>
                 <a:latin typeface="Aptos" panose="020B0004020202020204" pitchFamily="34" charset="0"/>
               </a:rPr>
-              <a:t>10-year return period for 24-hourly total precipitation [mm/24h]</a:t>
+              <a:t>10-year return period (=99.9726</a:t>
+            </a:r>
+            <a:r>
+              <a:rPr lang="en-US" sz="1000" b="1" baseline="30000" dirty="0">
+                <a:solidFill>
+                  <a:schemeClr val="tx1">
+                    <a:lumMod val="85000"/>
+                    <a:lumOff val="15000"/>
+                  </a:schemeClr>
+                </a:solidFill>
+                <a:latin typeface="Aptos" panose="020B0004020202020204" pitchFamily="34" charset="0"/>
+              </a:rPr>
+              <a:t>th</a:t>
+            </a:r>
+            <a:r>
+              <a:rPr lang="en-US" sz="1000" b="1" dirty="0">
+                <a:solidFill>
+                  <a:schemeClr val="tx1">
+                    <a:lumMod val="85000"/>
+                    <a:lumOff val="15000"/>
+                  </a:schemeClr>
+                </a:solidFill>
+                <a:latin typeface="Aptos" panose="020B0004020202020204" pitchFamily="34" charset="0"/>
+              </a:rPr>
+              <a:t> percentile) for 24-hourly total precipitation [mm/24h]</a:t>
             </a:r>
           </a:p>
           <a:p>

</xml_diff>